<commit_message>
In notebook 09_compat, added isinstance assertions so it can double as a test. In notebook 10_schemas, added a picture for encoding and decoding during search. Modernized installation instructions for Python 3.7.
Signed-off-by: Martin Hirzel <hirzel@gmail.com>
</commit_message>
<xml_diff>
--- a/talks/2022-0816-lale.pptx
+++ b/talks/2022-0816-lale.pptx
@@ -5,9 +5,11 @@
     <p:sldMasterId id="2147483660" r:id="rId1"/>
   </p:sldMasterIdLst>
   <p:sldIdLst>
-    <p:sldId id="258" r:id="rId2"/>
-    <p:sldId id="257" r:id="rId3"/>
-    <p:sldId id="256" r:id="rId4"/>
+    <p:sldId id="259" r:id="rId2"/>
+    <p:sldId id="258" r:id="rId3"/>
+    <p:sldId id="257" r:id="rId4"/>
+    <p:sldId id="256" r:id="rId5"/>
+    <p:sldId id="260" r:id="rId6"/>
   </p:sldIdLst>
   <p:sldSz cx="9144000" cy="6858000" type="screen4x3"/>
   <p:notesSz cx="6858000" cy="9144000"/>
@@ -245,7 +247,7 @@
           <a:p>
             <a:fld id="{C3ED7C7B-A01C-4333-8566-9F1FF6A5213D}" type="datetimeFigureOut">
               <a:rPr lang="en-US" smtClean="0"/>
-              <a:t>7/29/2022</a:t>
+              <a:t>8/7/2022</a:t>
             </a:fld>
             <a:endParaRPr lang="en-US"/>
           </a:p>
@@ -415,7 +417,7 @@
           <a:p>
             <a:fld id="{C3ED7C7B-A01C-4333-8566-9F1FF6A5213D}" type="datetimeFigureOut">
               <a:rPr lang="en-US" smtClean="0"/>
-              <a:t>7/29/2022</a:t>
+              <a:t>8/7/2022</a:t>
             </a:fld>
             <a:endParaRPr lang="en-US"/>
           </a:p>
@@ -595,7 +597,7 @@
           <a:p>
             <a:fld id="{C3ED7C7B-A01C-4333-8566-9F1FF6A5213D}" type="datetimeFigureOut">
               <a:rPr lang="en-US" smtClean="0"/>
-              <a:t>7/29/2022</a:t>
+              <a:t>8/7/2022</a:t>
             </a:fld>
             <a:endParaRPr lang="en-US"/>
           </a:p>
@@ -765,7 +767,7 @@
           <a:p>
             <a:fld id="{C3ED7C7B-A01C-4333-8566-9F1FF6A5213D}" type="datetimeFigureOut">
               <a:rPr lang="en-US" smtClean="0"/>
-              <a:t>7/29/2022</a:t>
+              <a:t>8/7/2022</a:t>
             </a:fld>
             <a:endParaRPr lang="en-US"/>
           </a:p>
@@ -1009,7 +1011,7 @@
           <a:p>
             <a:fld id="{C3ED7C7B-A01C-4333-8566-9F1FF6A5213D}" type="datetimeFigureOut">
               <a:rPr lang="en-US" smtClean="0"/>
-              <a:t>7/29/2022</a:t>
+              <a:t>8/7/2022</a:t>
             </a:fld>
             <a:endParaRPr lang="en-US"/>
           </a:p>
@@ -1241,7 +1243,7 @@
           <a:p>
             <a:fld id="{C3ED7C7B-A01C-4333-8566-9F1FF6A5213D}" type="datetimeFigureOut">
               <a:rPr lang="en-US" smtClean="0"/>
-              <a:t>7/29/2022</a:t>
+              <a:t>8/7/2022</a:t>
             </a:fld>
             <a:endParaRPr lang="en-US"/>
           </a:p>
@@ -1608,7 +1610,7 @@
           <a:p>
             <a:fld id="{C3ED7C7B-A01C-4333-8566-9F1FF6A5213D}" type="datetimeFigureOut">
               <a:rPr lang="en-US" smtClean="0"/>
-              <a:t>7/29/2022</a:t>
+              <a:t>8/7/2022</a:t>
             </a:fld>
             <a:endParaRPr lang="en-US"/>
           </a:p>
@@ -1726,7 +1728,7 @@
           <a:p>
             <a:fld id="{C3ED7C7B-A01C-4333-8566-9F1FF6A5213D}" type="datetimeFigureOut">
               <a:rPr lang="en-US" smtClean="0"/>
-              <a:t>7/29/2022</a:t>
+              <a:t>8/7/2022</a:t>
             </a:fld>
             <a:endParaRPr lang="en-US"/>
           </a:p>
@@ -1821,7 +1823,7 @@
           <a:p>
             <a:fld id="{C3ED7C7B-A01C-4333-8566-9F1FF6A5213D}" type="datetimeFigureOut">
               <a:rPr lang="en-US" smtClean="0"/>
-              <a:t>7/29/2022</a:t>
+              <a:t>8/7/2022</a:t>
             </a:fld>
             <a:endParaRPr lang="en-US"/>
           </a:p>
@@ -2098,7 +2100,7 @@
           <a:p>
             <a:fld id="{C3ED7C7B-A01C-4333-8566-9F1FF6A5213D}" type="datetimeFigureOut">
               <a:rPr lang="en-US" smtClean="0"/>
-              <a:t>7/29/2022</a:t>
+              <a:t>8/7/2022</a:t>
             </a:fld>
             <a:endParaRPr lang="en-US"/>
           </a:p>
@@ -2355,7 +2357,7 @@
           <a:p>
             <a:fld id="{C3ED7C7B-A01C-4333-8566-9F1FF6A5213D}" type="datetimeFigureOut">
               <a:rPr lang="en-US" smtClean="0"/>
-              <a:t>7/29/2022</a:t>
+              <a:t>8/7/2022</a:t>
             </a:fld>
             <a:endParaRPr lang="en-US"/>
           </a:p>
@@ -2568,7 +2570,7 @@
           <a:p>
             <a:fld id="{C3ED7C7B-A01C-4333-8566-9F1FF6A5213D}" type="datetimeFigureOut">
               <a:rPr lang="en-US" smtClean="0"/>
-              <a:t>7/29/2022</a:t>
+              <a:t>8/7/2022</a:t>
             </a:fld>
             <a:endParaRPr lang="en-US"/>
           </a:p>
@@ -2957,6 +2959,73 @@
 </file>
 
 <file path=ppt/slides/slide1.xml><?xml version="1.0" encoding="utf-8"?>
+<p:sld xmlns:a="http://schemas.openxmlformats.org/drawingml/2006/main" xmlns:r="http://schemas.openxmlformats.org/officeDocument/2006/relationships" xmlns:p="http://schemas.openxmlformats.org/presentationml/2006/main">
+  <p:cSld>
+    <p:spTree>
+      <p:nvGrpSpPr>
+        <p:cNvPr id="1" name=""/>
+        <p:cNvGrpSpPr/>
+        <p:nvPr/>
+      </p:nvGrpSpPr>
+      <p:grpSpPr>
+        <a:xfrm>
+          <a:off x="0" y="0"/>
+          <a:ext cx="0" cy="0"/>
+          <a:chOff x="0" y="0"/>
+          <a:chExt cx="0" cy="0"/>
+        </a:xfrm>
+      </p:grpSpPr>
+      <p:sp>
+        <p:nvSpPr>
+          <p:cNvPr id="4" name="TextBox 3">
+            <a:extLst>
+              <a:ext uri="{FF2B5EF4-FFF2-40B4-BE49-F238E27FC236}">
+                <a16:creationId xmlns:a16="http://schemas.microsoft.com/office/drawing/2014/main" id="{334FC6D5-7E5C-412A-A9A5-A21E557B3F49}"/>
+              </a:ext>
+            </a:extLst>
+          </p:cNvPr>
+          <p:cNvSpPr txBox="1"/>
+          <p:nvPr/>
+        </p:nvSpPr>
+        <p:spPr>
+          <a:xfrm>
+            <a:off x="1708660" y="1490008"/>
+            <a:ext cx="5726680" cy="1938992"/>
+          </a:xfrm>
+          <a:prstGeom prst="rect">
+            <a:avLst/>
+          </a:prstGeom>
+          <a:noFill/>
+        </p:spPr>
+        <p:txBody>
+          <a:bodyPr wrap="square" rtlCol="0">
+            <a:spAutoFit/>
+          </a:bodyPr>
+          <a:lstStyle/>
+          <a:p>
+            <a:r>
+              <a:rPr lang="en-US" sz="2400">
+                <a:latin typeface="Arial" panose="020B0604020202020204" pitchFamily="34" charset="0"/>
+              </a:rPr>
+              <a:t>This file contains drawings used in our KDD tutorial. The slides are not intended to be presented or understood out of context. Instead, please take a look at the tutorial notebooks.</a:t>
+            </a:r>
+          </a:p>
+        </p:txBody>
+      </p:sp>
+    </p:spTree>
+    <p:extLst>
+      <p:ext uri="{BB962C8B-B14F-4D97-AF65-F5344CB8AC3E}">
+        <p14:creationId xmlns:p14="http://schemas.microsoft.com/office/powerpoint/2010/main" val="2834257382"/>
+      </p:ext>
+    </p:extLst>
+  </p:cSld>
+  <p:clrMapOvr>
+    <a:masterClrMapping/>
+  </p:clrMapOvr>
+</p:sld>
+</file>
+
+<file path=ppt/slides/slide2.xml><?xml version="1.0" encoding="utf-8"?>
 <p:sld xmlns:a="http://schemas.openxmlformats.org/drawingml/2006/main" xmlns:r="http://schemas.openxmlformats.org/officeDocument/2006/relationships" xmlns:p="http://schemas.openxmlformats.org/presentationml/2006/main">
   <p:cSld>
     <p:spTree>
@@ -4164,7 +4233,7 @@
 </p:sld>
 </file>
 
-<file path=ppt/slides/slide2.xml><?xml version="1.0" encoding="utf-8"?>
+<file path=ppt/slides/slide3.xml><?xml version="1.0" encoding="utf-8"?>
 <p:sld xmlns:a="http://schemas.openxmlformats.org/drawingml/2006/main" xmlns:r="http://schemas.openxmlformats.org/officeDocument/2006/relationships" xmlns:p="http://schemas.openxmlformats.org/presentationml/2006/main">
   <p:cSld>
     <p:spTree>
@@ -5425,7 +5494,7 @@
 </p:sld>
 </file>
 
-<file path=ppt/slides/slide3.xml><?xml version="1.0" encoding="utf-8"?>
+<file path=ppt/slides/slide4.xml><?xml version="1.0" encoding="utf-8"?>
 <p:sld xmlns:a="http://schemas.openxmlformats.org/drawingml/2006/main" xmlns:r="http://schemas.openxmlformats.org/officeDocument/2006/relationships" xmlns:p="http://schemas.openxmlformats.org/presentationml/2006/main">
   <p:cSld>
     <p:spTree>
@@ -5571,7 +5640,7 @@
         </p:nvSpPr>
         <p:spPr>
           <a:xfrm>
-            <a:off x="3509398" y="1186002"/>
+            <a:off x="3625748" y="1058014"/>
             <a:ext cx="1097280" cy="640080"/>
           </a:xfrm>
           <a:prstGeom prst="rect">
@@ -6232,57 +6301,13 @@
         </p:nvCxnSpPr>
         <p:spPr>
           <a:xfrm>
-            <a:off x="6239143" y="2209920"/>
-            <a:ext cx="59841" cy="98647"/>
+            <a:off x="6165396" y="2126796"/>
+            <a:ext cx="133588" cy="181771"/>
           </a:xfrm>
           <a:prstGeom prst="straightConnector1">
             <a:avLst/>
           </a:prstGeom>
           <a:ln w="38100">
-            <a:solidFill>
-              <a:schemeClr val="tx1"/>
-            </a:solidFill>
-            <a:tailEnd type="triangle" w="lg" len="lg"/>
-          </a:ln>
-        </p:spPr>
-        <p:style>
-          <a:lnRef idx="1">
-            <a:schemeClr val="accent1"/>
-          </a:lnRef>
-          <a:fillRef idx="0">
-            <a:schemeClr val="accent1"/>
-          </a:fillRef>
-          <a:effectRef idx="0">
-            <a:schemeClr val="accent1"/>
-          </a:effectRef>
-          <a:fontRef idx="minor">
-            <a:schemeClr val="tx1"/>
-          </a:fontRef>
-        </p:style>
-      </p:cxnSp>
-      <p:cxnSp>
-        <p:nvCxnSpPr>
-          <p:cNvPr id="44" name="Straight Arrow Connector 43">
-            <a:extLst>
-              <a:ext uri="{FF2B5EF4-FFF2-40B4-BE49-F238E27FC236}">
-                <a16:creationId xmlns:a16="http://schemas.microsoft.com/office/drawing/2014/main" id="{B0156708-E1D3-4D94-8384-FF73E16BB45E}"/>
-              </a:ext>
-            </a:extLst>
-          </p:cNvPr>
-          <p:cNvCxnSpPr>
-            <a:cxnSpLocks/>
-          </p:cNvCxnSpPr>
-          <p:nvPr/>
-        </p:nvCxnSpPr>
-        <p:spPr>
-          <a:xfrm flipV="1">
-            <a:off x="3370489" y="1664578"/>
-            <a:ext cx="137548" cy="94825"/>
-          </a:xfrm>
-          <a:prstGeom prst="straightConnector1">
-            <a:avLst/>
-          </a:prstGeom>
-          <a:ln w="25400">
             <a:solidFill>
               <a:schemeClr val="tx1"/>
             </a:solidFill>
@@ -6433,7 +6458,7 @@
         </p:nvSpPr>
         <p:spPr>
           <a:xfrm>
-            <a:off x="2404634" y="1738511"/>
+            <a:off x="2415430" y="1770534"/>
             <a:ext cx="556563" cy="369332"/>
           </a:xfrm>
           <a:prstGeom prst="rect">
@@ -6470,7 +6495,7 @@
         </p:nvSpPr>
         <p:spPr>
           <a:xfrm>
-            <a:off x="4751170" y="1695203"/>
+            <a:off x="4899577" y="1691055"/>
             <a:ext cx="928459" cy="369332"/>
           </a:xfrm>
           <a:prstGeom prst="rect">
@@ -6797,8 +6822,8 @@
         </p:nvCxnSpPr>
         <p:spPr>
           <a:xfrm flipH="1">
-            <a:off x="6554050" y="3765156"/>
-            <a:ext cx="36263" cy="144197"/>
+            <a:off x="6573606" y="3703864"/>
+            <a:ext cx="36744" cy="205489"/>
           </a:xfrm>
           <a:prstGeom prst="straightConnector1">
             <a:avLst/>
@@ -6841,8 +6866,52 @@
         </p:nvCxnSpPr>
         <p:spPr>
           <a:xfrm flipH="1" flipV="1">
-            <a:off x="3924862" y="3749039"/>
-            <a:ext cx="49883" cy="143965"/>
+            <a:off x="3918057" y="3749039"/>
+            <a:ext cx="76702" cy="209279"/>
+          </a:xfrm>
+          <a:prstGeom prst="straightConnector1">
+            <a:avLst/>
+          </a:prstGeom>
+          <a:ln w="38100">
+            <a:solidFill>
+              <a:schemeClr val="tx1"/>
+            </a:solidFill>
+            <a:tailEnd type="triangle" w="lg" len="lg"/>
+          </a:ln>
+        </p:spPr>
+        <p:style>
+          <a:lnRef idx="1">
+            <a:schemeClr val="accent1"/>
+          </a:lnRef>
+          <a:fillRef idx="0">
+            <a:schemeClr val="accent1"/>
+          </a:fillRef>
+          <a:effectRef idx="0">
+            <a:schemeClr val="accent1"/>
+          </a:effectRef>
+          <a:fontRef idx="minor">
+            <a:schemeClr val="tx1"/>
+          </a:fontRef>
+        </p:style>
+      </p:cxnSp>
+      <p:cxnSp>
+        <p:nvCxnSpPr>
+          <p:cNvPr id="28" name="Straight Arrow Connector 27">
+            <a:extLst>
+              <a:ext uri="{FF2B5EF4-FFF2-40B4-BE49-F238E27FC236}">
+                <a16:creationId xmlns:a16="http://schemas.microsoft.com/office/drawing/2014/main" id="{FFEBCD54-74DB-47FA-B972-BA420781349E}"/>
+              </a:ext>
+            </a:extLst>
+          </p:cNvPr>
+          <p:cNvCxnSpPr>
+            <a:cxnSpLocks/>
+          </p:cNvCxnSpPr>
+          <p:nvPr/>
+        </p:nvCxnSpPr>
+        <p:spPr>
+          <a:xfrm flipV="1">
+            <a:off x="3414032" y="1586093"/>
+            <a:ext cx="211716" cy="145890"/>
           </a:xfrm>
           <a:prstGeom prst="straightConnector1">
             <a:avLst/>
@@ -6873,6 +6942,1793 @@
     <p:extLst>
       <p:ext uri="{BB962C8B-B14F-4D97-AF65-F5344CB8AC3E}">
         <p14:creationId xmlns:p14="http://schemas.microsoft.com/office/powerpoint/2010/main" val="2087150795"/>
+      </p:ext>
+    </p:extLst>
+  </p:cSld>
+  <p:clrMapOvr>
+    <a:masterClrMapping/>
+  </p:clrMapOvr>
+</p:sld>
+</file>
+
+<file path=ppt/slides/slide5.xml><?xml version="1.0" encoding="utf-8"?>
+<p:sld xmlns:a="http://schemas.openxmlformats.org/drawingml/2006/main" xmlns:r="http://schemas.openxmlformats.org/officeDocument/2006/relationships" xmlns:p="http://schemas.openxmlformats.org/presentationml/2006/main">
+  <p:cSld>
+    <p:spTree>
+      <p:nvGrpSpPr>
+        <p:cNvPr id="1" name=""/>
+        <p:cNvGrpSpPr/>
+        <p:nvPr/>
+      </p:nvGrpSpPr>
+      <p:grpSpPr>
+        <a:xfrm>
+          <a:off x="0" y="0"/>
+          <a:ext cx="0" cy="0"/>
+          <a:chOff x="0" y="0"/>
+          <a:chExt cx="0" cy="0"/>
+        </a:xfrm>
+      </p:grpSpPr>
+      <p:sp>
+        <p:nvSpPr>
+          <p:cNvPr id="6" name="Arc 5">
+            <a:extLst>
+              <a:ext uri="{FF2B5EF4-FFF2-40B4-BE49-F238E27FC236}">
+                <a16:creationId xmlns:a16="http://schemas.microsoft.com/office/drawing/2014/main" id="{BB659DBD-B989-468A-B0BC-D80E8CEA958F}"/>
+              </a:ext>
+            </a:extLst>
+          </p:cNvPr>
+          <p:cNvSpPr/>
+          <p:nvPr/>
+        </p:nvSpPr>
+        <p:spPr>
+          <a:xfrm>
+            <a:off x="2514600" y="1371600"/>
+            <a:ext cx="4114800" cy="4114800"/>
+          </a:xfrm>
+          <a:prstGeom prst="arc">
+            <a:avLst>
+              <a:gd name="adj1" fmla="val 11773828"/>
+              <a:gd name="adj2" fmla="val 10173614"/>
+            </a:avLst>
+          </a:prstGeom>
+          <a:ln w="38100">
+            <a:solidFill>
+              <a:schemeClr val="tx1"/>
+            </a:solidFill>
+            <a:tailEnd type="triangle" w="lg" len="lg"/>
+          </a:ln>
+        </p:spPr>
+        <p:style>
+          <a:lnRef idx="1">
+            <a:schemeClr val="accent1"/>
+          </a:lnRef>
+          <a:fillRef idx="0">
+            <a:schemeClr val="accent1"/>
+          </a:fillRef>
+          <a:effectRef idx="0">
+            <a:schemeClr val="accent1"/>
+          </a:effectRef>
+          <a:fontRef idx="minor">
+            <a:schemeClr val="tx1"/>
+          </a:fontRef>
+        </p:style>
+        <p:txBody>
+          <a:bodyPr rtlCol="0" anchor="ctr"/>
+          <a:lstStyle/>
+          <a:p>
+            <a:pPr algn="ctr"/>
+            <a:endParaRPr lang="en-US"/>
+          </a:p>
+        </p:txBody>
+      </p:sp>
+      <p:sp>
+        <p:nvSpPr>
+          <p:cNvPr id="11" name="Rectangle 10">
+            <a:extLst>
+              <a:ext uri="{FF2B5EF4-FFF2-40B4-BE49-F238E27FC236}">
+                <a16:creationId xmlns:a16="http://schemas.microsoft.com/office/drawing/2014/main" id="{7A2DAAF4-ABC5-4C89-85BC-E297B70D092E}"/>
+              </a:ext>
+            </a:extLst>
+          </p:cNvPr>
+          <p:cNvSpPr/>
+          <p:nvPr/>
+        </p:nvSpPr>
+        <p:spPr>
+          <a:xfrm>
+            <a:off x="6110793" y="2787962"/>
+            <a:ext cx="1097280" cy="640080"/>
+          </a:xfrm>
+          <a:prstGeom prst="rect">
+            <a:avLst/>
+          </a:prstGeom>
+          <a:solidFill>
+            <a:srgbClr val="B0E2FF"/>
+          </a:solidFill>
+          <a:ln>
+            <a:solidFill>
+              <a:schemeClr val="tx1"/>
+            </a:solidFill>
+          </a:ln>
+        </p:spPr>
+        <p:style>
+          <a:lnRef idx="2">
+            <a:schemeClr val="accent1">
+              <a:shade val="50000"/>
+            </a:schemeClr>
+          </a:lnRef>
+          <a:fillRef idx="1">
+            <a:schemeClr val="accent1"/>
+          </a:fillRef>
+          <a:effectRef idx="0">
+            <a:schemeClr val="accent1"/>
+          </a:effectRef>
+          <a:fontRef idx="minor">
+            <a:schemeClr val="lt1"/>
+          </a:fontRef>
+        </p:style>
+        <p:txBody>
+          <a:bodyPr rtlCol="0" anchor="ctr"/>
+          <a:lstStyle/>
+          <a:p>
+            <a:pPr algn="ctr"/>
+            <a:r>
+              <a:rPr lang="en-US">
+                <a:solidFill>
+                  <a:schemeClr val="tx1"/>
+                </a:solidFill>
+                <a:latin typeface="Arial" panose="020B0604020202020204" pitchFamily="34" charset="0"/>
+              </a:rPr>
+              <a:t>trainable pipeline</a:t>
+            </a:r>
+          </a:p>
+        </p:txBody>
+      </p:sp>
+      <p:sp>
+        <p:nvSpPr>
+          <p:cNvPr id="13" name="Rectangle 12">
+            <a:extLst>
+              <a:ext uri="{FF2B5EF4-FFF2-40B4-BE49-F238E27FC236}">
+                <a16:creationId xmlns:a16="http://schemas.microsoft.com/office/drawing/2014/main" id="{44E6BB94-EE4A-4D82-8D8F-BD1F5A69F4B9}"/>
+              </a:ext>
+            </a:extLst>
+          </p:cNvPr>
+          <p:cNvSpPr/>
+          <p:nvPr/>
+        </p:nvSpPr>
+        <p:spPr>
+          <a:xfrm>
+            <a:off x="2682915" y="1612521"/>
+            <a:ext cx="1097280" cy="640080"/>
+          </a:xfrm>
+          <a:prstGeom prst="rect">
+            <a:avLst/>
+          </a:prstGeom>
+          <a:solidFill>
+            <a:srgbClr val="7EC0EF"/>
+          </a:solidFill>
+          <a:ln>
+            <a:solidFill>
+              <a:schemeClr val="tx1"/>
+            </a:solidFill>
+          </a:ln>
+        </p:spPr>
+        <p:style>
+          <a:lnRef idx="2">
+            <a:schemeClr val="accent1">
+              <a:shade val="50000"/>
+            </a:schemeClr>
+          </a:lnRef>
+          <a:fillRef idx="1">
+            <a:schemeClr val="accent1"/>
+          </a:fillRef>
+          <a:effectRef idx="0">
+            <a:schemeClr val="accent1"/>
+          </a:effectRef>
+          <a:fontRef idx="minor">
+            <a:schemeClr val="lt1"/>
+          </a:fontRef>
+        </p:style>
+        <p:txBody>
+          <a:bodyPr rtlCol="0" anchor="ctr"/>
+          <a:lstStyle/>
+          <a:p>
+            <a:pPr algn="ctr"/>
+            <a:r>
+              <a:rPr lang="en-US">
+                <a:solidFill>
+                  <a:schemeClr val="tx1"/>
+                </a:solidFill>
+                <a:latin typeface="Arial" panose="020B0604020202020204" pitchFamily="34" charset="0"/>
+              </a:rPr>
+              <a:t>planned pipeline</a:t>
+            </a:r>
+          </a:p>
+        </p:txBody>
+      </p:sp>
+      <p:grpSp>
+        <p:nvGrpSpPr>
+          <p:cNvPr id="22" name="Group 17">
+            <a:extLst>
+              <a:ext uri="{FF2B5EF4-FFF2-40B4-BE49-F238E27FC236}">
+                <a16:creationId xmlns:a16="http://schemas.microsoft.com/office/drawing/2014/main" id="{BAB1607B-285B-4525-9C5C-282B9313ABB1}"/>
+              </a:ext>
+            </a:extLst>
+          </p:cNvPr>
+          <p:cNvGrpSpPr>
+            <a:grpSpLocks noChangeAspect="1"/>
+          </p:cNvGrpSpPr>
+          <p:nvPr/>
+        </p:nvGrpSpPr>
+        <p:grpSpPr bwMode="auto">
+          <a:xfrm>
+            <a:off x="1902907" y="2799676"/>
+            <a:ext cx="1097280" cy="1532965"/>
+            <a:chOff x="924868" y="2313973"/>
+            <a:chExt cx="1188720" cy="1659573"/>
+          </a:xfrm>
+        </p:grpSpPr>
+        <p:sp>
+          <p:nvSpPr>
+            <p:cNvPr id="23" name="Arc 22">
+              <a:extLst>
+                <a:ext uri="{FF2B5EF4-FFF2-40B4-BE49-F238E27FC236}">
+                  <a16:creationId xmlns:a16="http://schemas.microsoft.com/office/drawing/2014/main" id="{7817B56E-4927-4934-BCA1-037565B950B7}"/>
+                </a:ext>
+              </a:extLst>
+            </p:cNvPr>
+            <p:cNvSpPr/>
+            <p:nvPr/>
+          </p:nvSpPr>
+          <p:spPr>
+            <a:xfrm>
+              <a:off x="1244296" y="2313973"/>
+              <a:ext cx="549862" cy="547898"/>
+            </a:xfrm>
+            <a:prstGeom prst="arc">
+              <a:avLst>
+                <a:gd name="adj1" fmla="val 7390944"/>
+                <a:gd name="adj2" fmla="val 3400725"/>
+              </a:avLst>
+            </a:prstGeom>
+            <a:ln>
+              <a:solidFill>
+                <a:schemeClr val="tx1"/>
+              </a:solidFill>
+            </a:ln>
+            <a:effectLst/>
+          </p:spPr>
+          <p:style>
+            <a:lnRef idx="2">
+              <a:schemeClr val="accent1"/>
+            </a:lnRef>
+            <a:fillRef idx="0">
+              <a:schemeClr val="accent1"/>
+            </a:fillRef>
+            <a:effectRef idx="1">
+              <a:schemeClr val="accent1"/>
+            </a:effectRef>
+            <a:fontRef idx="minor">
+              <a:schemeClr val="tx1"/>
+            </a:fontRef>
+          </p:style>
+          <p:txBody>
+            <a:bodyPr anchor="ctr"/>
+            <a:lstStyle/>
+            <a:p>
+              <a:pPr marL="0" marR="0" lvl="0" indent="0" algn="ctr" defTabSz="457200" rtl="0" eaLnBrk="0" fontAlgn="base" latinLnBrk="0" hangingPunct="0">
+                <a:lnSpc>
+                  <a:spcPct val="100000"/>
+                </a:lnSpc>
+                <a:spcBef>
+                  <a:spcPct val="0"/>
+                </a:spcBef>
+                <a:spcAft>
+                  <a:spcPct val="0"/>
+                </a:spcAft>
+                <a:buClrTx/>
+                <a:buSzTx/>
+                <a:buFontTx/>
+                <a:buNone/>
+                <a:tabLst/>
+                <a:defRPr/>
+              </a:pPr>
+              <a:endParaRPr kumimoji="0" lang="en-US" sz="1800" b="0" i="0" u="none" strike="noStrike" kern="1200" cap="none" spc="0" normalizeH="0" noProof="0">
+                <a:ln>
+                  <a:noFill/>
+                </a:ln>
+                <a:effectLst/>
+                <a:uLnTx/>
+                <a:uFillTx/>
+                <a:latin typeface="Arial" panose="020B0604020202020204" pitchFamily="34" charset="0"/>
+                <a:ea typeface="+mn-ea"/>
+                <a:cs typeface="+mn-cs"/>
+              </a:endParaRPr>
+            </a:p>
+          </p:txBody>
+        </p:sp>
+        <p:sp>
+          <p:nvSpPr>
+            <p:cNvPr id="24" name="Arc 23">
+              <a:extLst>
+                <a:ext uri="{FF2B5EF4-FFF2-40B4-BE49-F238E27FC236}">
+                  <a16:creationId xmlns:a16="http://schemas.microsoft.com/office/drawing/2014/main" id="{6D30EBA6-DC5D-436D-894E-F61E3B202027}"/>
+                </a:ext>
+              </a:extLst>
+            </p:cNvPr>
+            <p:cNvSpPr/>
+            <p:nvPr/>
+          </p:nvSpPr>
+          <p:spPr>
+            <a:xfrm>
+              <a:off x="924868" y="2784053"/>
+              <a:ext cx="1188720" cy="1189493"/>
+            </a:xfrm>
+            <a:prstGeom prst="arc">
+              <a:avLst>
+                <a:gd name="adj1" fmla="val 10753943"/>
+                <a:gd name="adj2" fmla="val 15185757"/>
+              </a:avLst>
+            </a:prstGeom>
+            <a:noFill/>
+            <a:ln>
+              <a:solidFill>
+                <a:schemeClr val="tx1"/>
+              </a:solidFill>
+            </a:ln>
+            <a:effectLst/>
+          </p:spPr>
+          <p:style>
+            <a:lnRef idx="2">
+              <a:schemeClr val="accent1"/>
+            </a:lnRef>
+            <a:fillRef idx="0">
+              <a:schemeClr val="accent1"/>
+            </a:fillRef>
+            <a:effectRef idx="1">
+              <a:schemeClr val="accent1"/>
+            </a:effectRef>
+            <a:fontRef idx="minor">
+              <a:schemeClr val="tx1"/>
+            </a:fontRef>
+          </p:style>
+          <p:txBody>
+            <a:bodyPr anchor="ctr"/>
+            <a:lstStyle/>
+            <a:p>
+              <a:pPr marL="0" marR="0" lvl="0" indent="0" algn="ctr" defTabSz="457200" rtl="0" eaLnBrk="0" fontAlgn="base" latinLnBrk="0" hangingPunct="0">
+                <a:lnSpc>
+                  <a:spcPct val="100000"/>
+                </a:lnSpc>
+                <a:spcBef>
+                  <a:spcPct val="0"/>
+                </a:spcBef>
+                <a:spcAft>
+                  <a:spcPct val="0"/>
+                </a:spcAft>
+                <a:buClrTx/>
+                <a:buSzTx/>
+                <a:buFontTx/>
+                <a:buNone/>
+                <a:tabLst/>
+                <a:defRPr/>
+              </a:pPr>
+              <a:endParaRPr kumimoji="0" lang="en-US" sz="1800" b="0" i="0" u="none" strike="noStrike" kern="1200" cap="none" spc="0" normalizeH="0" noProof="0">
+                <a:ln>
+                  <a:noFill/>
+                </a:ln>
+                <a:effectLst/>
+                <a:uLnTx/>
+                <a:uFillTx/>
+                <a:latin typeface="Arial" panose="020B0604020202020204" pitchFamily="34" charset="0"/>
+                <a:ea typeface="+mn-ea"/>
+                <a:cs typeface="+mn-cs"/>
+              </a:endParaRPr>
+            </a:p>
+          </p:txBody>
+        </p:sp>
+        <p:sp>
+          <p:nvSpPr>
+            <p:cNvPr id="25" name="Arc 24">
+              <a:extLst>
+                <a:ext uri="{FF2B5EF4-FFF2-40B4-BE49-F238E27FC236}">
+                  <a16:creationId xmlns:a16="http://schemas.microsoft.com/office/drawing/2014/main" id="{DE23F581-9378-4092-98FD-87AF86D2F9BA}"/>
+                </a:ext>
+              </a:extLst>
+            </p:cNvPr>
+            <p:cNvSpPr/>
+            <p:nvPr/>
+          </p:nvSpPr>
+          <p:spPr>
+            <a:xfrm>
+              <a:off x="924868" y="2784053"/>
+              <a:ext cx="1188720" cy="1189493"/>
+            </a:xfrm>
+            <a:prstGeom prst="arc">
+              <a:avLst>
+                <a:gd name="adj1" fmla="val 17167860"/>
+                <a:gd name="adj2" fmla="val 22496"/>
+              </a:avLst>
+            </a:prstGeom>
+            <a:noFill/>
+            <a:ln>
+              <a:solidFill>
+                <a:schemeClr val="tx1"/>
+              </a:solidFill>
+            </a:ln>
+            <a:effectLst/>
+          </p:spPr>
+          <p:style>
+            <a:lnRef idx="2">
+              <a:schemeClr val="accent1"/>
+            </a:lnRef>
+            <a:fillRef idx="0">
+              <a:schemeClr val="accent1"/>
+            </a:fillRef>
+            <a:effectRef idx="1">
+              <a:schemeClr val="accent1"/>
+            </a:effectRef>
+            <a:fontRef idx="minor">
+              <a:schemeClr val="tx1"/>
+            </a:fontRef>
+          </p:style>
+          <p:txBody>
+            <a:bodyPr wrap="none" anchor="ctr"/>
+            <a:lstStyle/>
+            <a:p>
+              <a:pPr marL="0" marR="0" lvl="0" indent="0" algn="ctr" defTabSz="457200" rtl="0" eaLnBrk="0" fontAlgn="base" latinLnBrk="0" hangingPunct="0">
+                <a:lnSpc>
+                  <a:spcPct val="100000"/>
+                </a:lnSpc>
+                <a:spcBef>
+                  <a:spcPct val="0"/>
+                </a:spcBef>
+                <a:spcAft>
+                  <a:spcPct val="0"/>
+                </a:spcAft>
+                <a:buClrTx/>
+                <a:buSzTx/>
+                <a:buFontTx/>
+                <a:buNone/>
+                <a:tabLst/>
+                <a:defRPr/>
+              </a:pPr>
+              <a:endParaRPr kumimoji="0" lang="en-US" sz="1800" b="0" i="0" u="none" strike="noStrike" kern="1200" cap="none" spc="0" normalizeH="0" noProof="0" dirty="0">
+                <a:ln>
+                  <a:noFill/>
+                </a:ln>
+                <a:effectLst/>
+                <a:uLnTx/>
+                <a:uFillTx/>
+                <a:latin typeface="Arial" panose="020B0604020202020204" pitchFamily="34" charset="0"/>
+                <a:ea typeface="+mn-ea"/>
+                <a:cs typeface="+mn-cs"/>
+              </a:endParaRPr>
+            </a:p>
+          </p:txBody>
+        </p:sp>
+        <p:sp>
+          <p:nvSpPr>
+            <p:cNvPr id="26" name="TextBox 7175">
+              <a:extLst>
+                <a:ext uri="{FF2B5EF4-FFF2-40B4-BE49-F238E27FC236}">
+                  <a16:creationId xmlns:a16="http://schemas.microsoft.com/office/drawing/2014/main" id="{6C75E26E-5618-4BDB-BA86-7D301F902057}"/>
+                </a:ext>
+              </a:extLst>
+            </p:cNvPr>
+            <p:cNvSpPr txBox="1">
+              <a:spLocks noChangeArrowheads="1"/>
+            </p:cNvSpPr>
+            <p:nvPr/>
+          </p:nvSpPr>
+          <p:spPr bwMode="auto">
+            <a:xfrm>
+              <a:off x="1205012" y="2887483"/>
+              <a:ext cx="634186" cy="369473"/>
+            </a:xfrm>
+            <a:prstGeom prst="rect">
+              <a:avLst/>
+            </a:prstGeom>
+            <a:noFill/>
+            <a:ln>
+              <a:noFill/>
+            </a:ln>
+            <a:extLst>
+              <a:ext uri="{91240B29-F687-4F45-9708-019B960494DF}">
+                <a14:hiddenLine xmlns:a14="http://schemas.microsoft.com/office/drawing/2010/main" w="9525">
+                  <a:solidFill>
+                    <a:srgbClr val="000000"/>
+                  </a:solidFill>
+                  <a:miter lim="800000"/>
+                  <a:headEnd/>
+                  <a:tailEnd/>
+                </a14:hiddenLine>
+              </a:ext>
+            </a:extLst>
+          </p:spPr>
+          <p:txBody>
+            <a:bodyPr wrap="none">
+              <a:spAutoFit/>
+            </a:bodyPr>
+            <a:lstStyle>
+              <a:lvl1pPr>
+                <a:spcBef>
+                  <a:spcPct val="20000"/>
+                </a:spcBef>
+                <a:buFont typeface="Arial" panose="020B0604020202020204" pitchFamily="34" charset="0"/>
+                <a:buChar char="•"/>
+                <a:defRPr sz="3200">
+                  <a:solidFill>
+                    <a:schemeClr val="tx1"/>
+                  </a:solidFill>
+                  <a:latin typeface="Calibri" panose="020F0502020204030204" pitchFamily="34" charset="0"/>
+                  <a:ea typeface="ＭＳ Ｐゴシック" panose="020B0600070205080204" pitchFamily="34" charset="-128"/>
+                </a:defRPr>
+              </a:lvl1pPr>
+              <a:lvl2pPr marL="742950" indent="-285750">
+                <a:spcBef>
+                  <a:spcPct val="20000"/>
+                </a:spcBef>
+                <a:buFont typeface="Arial" panose="020B0604020202020204" pitchFamily="34" charset="0"/>
+                <a:buChar char="–"/>
+                <a:defRPr sz="2800">
+                  <a:solidFill>
+                    <a:schemeClr val="tx1"/>
+                  </a:solidFill>
+                  <a:latin typeface="Calibri" panose="020F0502020204030204" pitchFamily="34" charset="0"/>
+                  <a:ea typeface="ＭＳ Ｐゴシック" panose="020B0600070205080204" pitchFamily="34" charset="-128"/>
+                </a:defRPr>
+              </a:lvl2pPr>
+              <a:lvl3pPr marL="1143000" indent="-228600">
+                <a:spcBef>
+                  <a:spcPct val="20000"/>
+                </a:spcBef>
+                <a:buFont typeface="Arial" panose="020B0604020202020204" pitchFamily="34" charset="0"/>
+                <a:buChar char="•"/>
+                <a:defRPr sz="2400">
+                  <a:solidFill>
+                    <a:schemeClr val="tx1"/>
+                  </a:solidFill>
+                  <a:latin typeface="Calibri" panose="020F0502020204030204" pitchFamily="34" charset="0"/>
+                  <a:ea typeface="ＭＳ Ｐゴシック" panose="020B0600070205080204" pitchFamily="34" charset="-128"/>
+                </a:defRPr>
+              </a:lvl3pPr>
+              <a:lvl4pPr marL="1600200" indent="-228600">
+                <a:spcBef>
+                  <a:spcPct val="20000"/>
+                </a:spcBef>
+                <a:buFont typeface="Arial" panose="020B0604020202020204" pitchFamily="34" charset="0"/>
+                <a:buChar char="–"/>
+                <a:defRPr sz="2000">
+                  <a:solidFill>
+                    <a:schemeClr val="tx1"/>
+                  </a:solidFill>
+                  <a:latin typeface="Calibri" panose="020F0502020204030204" pitchFamily="34" charset="0"/>
+                  <a:ea typeface="ＭＳ Ｐゴシック" panose="020B0600070205080204" pitchFamily="34" charset="-128"/>
+                </a:defRPr>
+              </a:lvl4pPr>
+              <a:lvl5pPr marL="2057400" indent="-228600">
+                <a:spcBef>
+                  <a:spcPct val="20000"/>
+                </a:spcBef>
+                <a:buFont typeface="Arial" panose="020B0604020202020204" pitchFamily="34" charset="0"/>
+                <a:buChar char="»"/>
+                <a:defRPr sz="2000">
+                  <a:solidFill>
+                    <a:schemeClr val="tx1"/>
+                  </a:solidFill>
+                  <a:latin typeface="Calibri" panose="020F0502020204030204" pitchFamily="34" charset="0"/>
+                  <a:ea typeface="ＭＳ Ｐゴシック" panose="020B0600070205080204" pitchFamily="34" charset="-128"/>
+                </a:defRPr>
+              </a:lvl5pPr>
+              <a:lvl6pPr marL="2514600" indent="-228600" defTabSz="457200" eaLnBrk="0" fontAlgn="base" hangingPunct="0">
+                <a:spcBef>
+                  <a:spcPct val="20000"/>
+                </a:spcBef>
+                <a:spcAft>
+                  <a:spcPct val="0"/>
+                </a:spcAft>
+                <a:buFont typeface="Arial" panose="020B0604020202020204" pitchFamily="34" charset="0"/>
+                <a:buChar char="»"/>
+                <a:defRPr sz="2000">
+                  <a:solidFill>
+                    <a:schemeClr val="tx1"/>
+                  </a:solidFill>
+                  <a:latin typeface="Calibri" panose="020F0502020204030204" pitchFamily="34" charset="0"/>
+                  <a:ea typeface="ＭＳ Ｐゴシック" panose="020B0600070205080204" pitchFamily="34" charset="-128"/>
+                </a:defRPr>
+              </a:lvl6pPr>
+              <a:lvl7pPr marL="2971800" indent="-228600" defTabSz="457200" eaLnBrk="0" fontAlgn="base" hangingPunct="0">
+                <a:spcBef>
+                  <a:spcPct val="20000"/>
+                </a:spcBef>
+                <a:spcAft>
+                  <a:spcPct val="0"/>
+                </a:spcAft>
+                <a:buFont typeface="Arial" panose="020B0604020202020204" pitchFamily="34" charset="0"/>
+                <a:buChar char="»"/>
+                <a:defRPr sz="2000">
+                  <a:solidFill>
+                    <a:schemeClr val="tx1"/>
+                  </a:solidFill>
+                  <a:latin typeface="Calibri" panose="020F0502020204030204" pitchFamily="34" charset="0"/>
+                  <a:ea typeface="ＭＳ Ｐゴシック" panose="020B0600070205080204" pitchFamily="34" charset="-128"/>
+                </a:defRPr>
+              </a:lvl7pPr>
+              <a:lvl8pPr marL="3429000" indent="-228600" defTabSz="457200" eaLnBrk="0" fontAlgn="base" hangingPunct="0">
+                <a:spcBef>
+                  <a:spcPct val="20000"/>
+                </a:spcBef>
+                <a:spcAft>
+                  <a:spcPct val="0"/>
+                </a:spcAft>
+                <a:buFont typeface="Arial" panose="020B0604020202020204" pitchFamily="34" charset="0"/>
+                <a:buChar char="»"/>
+                <a:defRPr sz="2000">
+                  <a:solidFill>
+                    <a:schemeClr val="tx1"/>
+                  </a:solidFill>
+                  <a:latin typeface="Calibri" panose="020F0502020204030204" pitchFamily="34" charset="0"/>
+                  <a:ea typeface="ＭＳ Ｐゴシック" panose="020B0600070205080204" pitchFamily="34" charset="-128"/>
+                </a:defRPr>
+              </a:lvl8pPr>
+              <a:lvl9pPr marL="3886200" indent="-228600" defTabSz="457200" eaLnBrk="0" fontAlgn="base" hangingPunct="0">
+                <a:spcBef>
+                  <a:spcPct val="20000"/>
+                </a:spcBef>
+                <a:spcAft>
+                  <a:spcPct val="0"/>
+                </a:spcAft>
+                <a:buFont typeface="Arial" panose="020B0604020202020204" pitchFamily="34" charset="0"/>
+                <a:buChar char="»"/>
+                <a:defRPr sz="2000">
+                  <a:solidFill>
+                    <a:schemeClr val="tx1"/>
+                  </a:solidFill>
+                  <a:latin typeface="Calibri" panose="020F0502020204030204" pitchFamily="34" charset="0"/>
+                  <a:ea typeface="ＭＳ Ｐゴシック" panose="020B0600070205080204" pitchFamily="34" charset="-128"/>
+                </a:defRPr>
+              </a:lvl9pPr>
+            </a:lstStyle>
+            <a:p>
+              <a:pPr marL="0" marR="0" lvl="0" indent="0" algn="ctr" defTabSz="457200" rtl="0" eaLnBrk="0" fontAlgn="base" latinLnBrk="0" hangingPunct="0">
+                <a:lnSpc>
+                  <a:spcPct val="100000"/>
+                </a:lnSpc>
+                <a:spcBef>
+                  <a:spcPct val="0"/>
+                </a:spcBef>
+                <a:spcAft>
+                  <a:spcPct val="0"/>
+                </a:spcAft>
+                <a:buClrTx/>
+                <a:buSzTx/>
+                <a:buFontTx/>
+                <a:buNone/>
+                <a:tabLst/>
+                <a:defRPr/>
+              </a:pPr>
+              <a:r>
+                <a:rPr kumimoji="0" lang="en-US" altLang="en-US" sz="1800" b="0" i="0" u="none" strike="noStrike" kern="1200" cap="none" spc="0" normalizeH="0" noProof="0">
+                  <a:ln>
+                    <a:noFill/>
+                  </a:ln>
+                  <a:effectLst/>
+                  <a:uLnTx/>
+                  <a:uFillTx/>
+                  <a:latin typeface="Arial" panose="020B0604020202020204" pitchFamily="34" charset="0"/>
+                  <a:ea typeface="ＭＳ Ｐゴシック" panose="020B0600070205080204" pitchFamily="34" charset="-128"/>
+                  <a:cs typeface="+mn-cs"/>
+                </a:rPr>
+                <a:t>user</a:t>
+              </a:r>
+              <a:endParaRPr kumimoji="0" lang="en-US" altLang="en-US" sz="1800" b="0" i="0" u="none" strike="noStrike" kern="1200" cap="none" spc="0" normalizeH="0" noProof="0" dirty="0">
+                <a:ln>
+                  <a:noFill/>
+                </a:ln>
+                <a:effectLst/>
+                <a:uLnTx/>
+                <a:uFillTx/>
+                <a:latin typeface="Arial" panose="020B0604020202020204" pitchFamily="34" charset="0"/>
+                <a:ea typeface="ＭＳ Ｐゴシック" panose="020B0600070205080204" pitchFamily="34" charset="-128"/>
+                <a:cs typeface="+mn-cs"/>
+              </a:endParaRPr>
+            </a:p>
+          </p:txBody>
+        </p:sp>
+      </p:grpSp>
+      <p:sp>
+        <p:nvSpPr>
+          <p:cNvPr id="29" name="Arc 28">
+            <a:extLst>
+              <a:ext uri="{FF2B5EF4-FFF2-40B4-BE49-F238E27FC236}">
+                <a16:creationId xmlns:a16="http://schemas.microsoft.com/office/drawing/2014/main" id="{09F6949D-3E2D-483C-8497-98E73FA0C55D}"/>
+              </a:ext>
+            </a:extLst>
+          </p:cNvPr>
+          <p:cNvSpPr/>
+          <p:nvPr/>
+        </p:nvSpPr>
+        <p:spPr>
+          <a:xfrm>
+            <a:off x="5310126" y="3371996"/>
+            <a:ext cx="914400" cy="914400"/>
+          </a:xfrm>
+          <a:prstGeom prst="arc">
+            <a:avLst>
+              <a:gd name="adj1" fmla="val 15774383"/>
+              <a:gd name="adj2" fmla="val 701900"/>
+            </a:avLst>
+          </a:prstGeom>
+          <a:ln w="12700">
+            <a:solidFill>
+              <a:schemeClr val="tx1"/>
+            </a:solidFill>
+            <a:tailEnd type="triangle" w="lg" len="lg"/>
+          </a:ln>
+        </p:spPr>
+        <p:style>
+          <a:lnRef idx="1">
+            <a:schemeClr val="accent1"/>
+          </a:lnRef>
+          <a:fillRef idx="0">
+            <a:schemeClr val="accent1"/>
+          </a:fillRef>
+          <a:effectRef idx="0">
+            <a:schemeClr val="accent1"/>
+          </a:effectRef>
+          <a:fontRef idx="minor">
+            <a:schemeClr val="tx1"/>
+          </a:fontRef>
+        </p:style>
+        <p:txBody>
+          <a:bodyPr rtlCol="0" anchor="ctr"/>
+          <a:lstStyle/>
+          <a:p>
+            <a:pPr algn="ctr"/>
+            <a:endParaRPr lang="en-US"/>
+          </a:p>
+        </p:txBody>
+      </p:sp>
+      <p:sp>
+        <p:nvSpPr>
+          <p:cNvPr id="30" name="Arc 29">
+            <a:extLst>
+              <a:ext uri="{FF2B5EF4-FFF2-40B4-BE49-F238E27FC236}">
+                <a16:creationId xmlns:a16="http://schemas.microsoft.com/office/drawing/2014/main" id="{19886EFD-FF6A-44AA-9433-66982E3447AC}"/>
+              </a:ext>
+            </a:extLst>
+          </p:cNvPr>
+          <p:cNvSpPr/>
+          <p:nvPr/>
+        </p:nvSpPr>
+        <p:spPr>
+          <a:xfrm>
+            <a:off x="4140962" y="3108959"/>
+            <a:ext cx="914400" cy="914400"/>
+          </a:xfrm>
+          <a:prstGeom prst="arc">
+            <a:avLst>
+              <a:gd name="adj1" fmla="val 1278672"/>
+              <a:gd name="adj2" fmla="val 9408329"/>
+            </a:avLst>
+          </a:prstGeom>
+          <a:ln w="12700">
+            <a:solidFill>
+              <a:schemeClr val="tx1"/>
+            </a:solidFill>
+            <a:tailEnd type="triangle" w="lg" len="lg"/>
+          </a:ln>
+        </p:spPr>
+        <p:style>
+          <a:lnRef idx="1">
+            <a:schemeClr val="accent1"/>
+          </a:lnRef>
+          <a:fillRef idx="0">
+            <a:schemeClr val="accent1"/>
+          </a:fillRef>
+          <a:effectRef idx="0">
+            <a:schemeClr val="accent1"/>
+          </a:effectRef>
+          <a:fontRef idx="minor">
+            <a:schemeClr val="tx1"/>
+          </a:fontRef>
+        </p:style>
+        <p:txBody>
+          <a:bodyPr rtlCol="0" anchor="ctr"/>
+          <a:lstStyle/>
+          <a:p>
+            <a:pPr algn="ctr"/>
+            <a:endParaRPr lang="en-US"/>
+          </a:p>
+        </p:txBody>
+      </p:sp>
+      <p:cxnSp>
+        <p:nvCxnSpPr>
+          <p:cNvPr id="38" name="Straight Arrow Connector 37">
+            <a:extLst>
+              <a:ext uri="{FF2B5EF4-FFF2-40B4-BE49-F238E27FC236}">
+                <a16:creationId xmlns:a16="http://schemas.microsoft.com/office/drawing/2014/main" id="{0C3C4993-3935-4FAD-8033-38EF929B48D7}"/>
+              </a:ext>
+            </a:extLst>
+          </p:cNvPr>
+          <p:cNvCxnSpPr>
+            <a:cxnSpLocks/>
+          </p:cNvCxnSpPr>
+          <p:nvPr/>
+        </p:nvCxnSpPr>
+        <p:spPr>
+          <a:xfrm>
+            <a:off x="5363807" y="2060807"/>
+            <a:ext cx="221316" cy="30285"/>
+          </a:xfrm>
+          <a:prstGeom prst="straightConnector1">
+            <a:avLst/>
+          </a:prstGeom>
+          <a:ln w="38100">
+            <a:solidFill>
+              <a:schemeClr val="tx1"/>
+            </a:solidFill>
+            <a:tailEnd type="triangle" w="lg" len="lg"/>
+          </a:ln>
+        </p:spPr>
+        <p:style>
+          <a:lnRef idx="1">
+            <a:schemeClr val="accent1"/>
+          </a:lnRef>
+          <a:fillRef idx="0">
+            <a:schemeClr val="accent1"/>
+          </a:fillRef>
+          <a:effectRef idx="0">
+            <a:schemeClr val="accent1"/>
+          </a:effectRef>
+          <a:fontRef idx="minor">
+            <a:schemeClr val="tx1"/>
+          </a:fontRef>
+        </p:style>
+      </p:cxnSp>
+      <p:sp>
+        <p:nvSpPr>
+          <p:cNvPr id="47" name="Arc 46">
+            <a:extLst>
+              <a:ext uri="{FF2B5EF4-FFF2-40B4-BE49-F238E27FC236}">
+                <a16:creationId xmlns:a16="http://schemas.microsoft.com/office/drawing/2014/main" id="{71FDB2C5-BC68-4066-819F-0A20385C24B8}"/>
+              </a:ext>
+            </a:extLst>
+          </p:cNvPr>
+          <p:cNvSpPr/>
+          <p:nvPr/>
+        </p:nvSpPr>
+        <p:spPr>
+          <a:xfrm>
+            <a:off x="2735362" y="3108959"/>
+            <a:ext cx="914400" cy="914400"/>
+          </a:xfrm>
+          <a:prstGeom prst="arc">
+            <a:avLst>
+              <a:gd name="adj1" fmla="val 1278672"/>
+              <a:gd name="adj2" fmla="val 8968526"/>
+            </a:avLst>
+          </a:prstGeom>
+          <a:ln w="12700">
+            <a:solidFill>
+              <a:schemeClr val="tx1"/>
+            </a:solidFill>
+            <a:tailEnd type="triangle" w="lg" len="lg"/>
+          </a:ln>
+        </p:spPr>
+        <p:style>
+          <a:lnRef idx="1">
+            <a:schemeClr val="accent1"/>
+          </a:lnRef>
+          <a:fillRef idx="0">
+            <a:schemeClr val="accent1"/>
+          </a:fillRef>
+          <a:effectRef idx="0">
+            <a:schemeClr val="accent1"/>
+          </a:effectRef>
+          <a:fontRef idx="minor">
+            <a:schemeClr val="tx1"/>
+          </a:fontRef>
+        </p:style>
+        <p:txBody>
+          <a:bodyPr rtlCol="0" anchor="ctr"/>
+          <a:lstStyle/>
+          <a:p>
+            <a:pPr algn="ctr"/>
+            <a:endParaRPr lang="en-US"/>
+          </a:p>
+        </p:txBody>
+      </p:sp>
+      <p:sp>
+        <p:nvSpPr>
+          <p:cNvPr id="27" name="Cylinder 26">
+            <a:extLst>
+              <a:ext uri="{FF2B5EF4-FFF2-40B4-BE49-F238E27FC236}">
+                <a16:creationId xmlns:a16="http://schemas.microsoft.com/office/drawing/2014/main" id="{7042DD10-FCE8-4749-9617-DD349939AD3A}"/>
+              </a:ext>
+            </a:extLst>
+          </p:cNvPr>
+          <p:cNvSpPr/>
+          <p:nvPr/>
+        </p:nvSpPr>
+        <p:spPr>
+          <a:xfrm>
+            <a:off x="4800598" y="3108959"/>
+            <a:ext cx="914400" cy="640080"/>
+          </a:xfrm>
+          <a:prstGeom prst="can">
+            <a:avLst/>
+          </a:prstGeom>
+          <a:solidFill>
+            <a:schemeClr val="accent3"/>
+          </a:solidFill>
+          <a:ln>
+            <a:solidFill>
+              <a:schemeClr val="tx1"/>
+            </a:solidFill>
+          </a:ln>
+        </p:spPr>
+        <p:style>
+          <a:lnRef idx="2">
+            <a:schemeClr val="accent1">
+              <a:shade val="50000"/>
+            </a:schemeClr>
+          </a:lnRef>
+          <a:fillRef idx="1">
+            <a:schemeClr val="accent1"/>
+          </a:fillRef>
+          <a:effectRef idx="0">
+            <a:schemeClr val="accent1"/>
+          </a:effectRef>
+          <a:fontRef idx="minor">
+            <a:schemeClr val="lt1"/>
+          </a:fontRef>
+        </p:style>
+        <p:txBody>
+          <a:bodyPr rtlCol="0" anchor="ctr"/>
+          <a:lstStyle/>
+          <a:p>
+            <a:pPr algn="ctr"/>
+            <a:r>
+              <a:rPr lang="en-US">
+                <a:solidFill>
+                  <a:schemeClr val="tx1"/>
+                </a:solidFill>
+                <a:latin typeface="Arial" panose="020B0604020202020204" pitchFamily="34" charset="0"/>
+              </a:rPr>
+              <a:t>data</a:t>
+            </a:r>
+          </a:p>
+        </p:txBody>
+      </p:sp>
+      <p:sp>
+        <p:nvSpPr>
+          <p:cNvPr id="48" name="TextBox 47">
+            <a:extLst>
+              <a:ext uri="{FF2B5EF4-FFF2-40B4-BE49-F238E27FC236}">
+                <a16:creationId xmlns:a16="http://schemas.microsoft.com/office/drawing/2014/main" id="{2E26934D-EFA2-475D-846D-5433B4461D6A}"/>
+              </a:ext>
+            </a:extLst>
+          </p:cNvPr>
+          <p:cNvSpPr txBox="1"/>
+          <p:nvPr/>
+        </p:nvSpPr>
+        <p:spPr>
+          <a:xfrm>
+            <a:off x="2054863" y="2325185"/>
+            <a:ext cx="556563" cy="369332"/>
+          </a:xfrm>
+          <a:prstGeom prst="rect">
+            <a:avLst/>
+          </a:prstGeom>
+          <a:noFill/>
+        </p:spPr>
+        <p:txBody>
+          <a:bodyPr wrap="none" rtlCol="0">
+            <a:spAutoFit/>
+          </a:bodyPr>
+          <a:lstStyle/>
+          <a:p>
+            <a:r>
+              <a:rPr lang="en-US" i="1">
+                <a:latin typeface="Arial" panose="020B0604020202020204" pitchFamily="34" charset="0"/>
+              </a:rPr>
+              <a:t>edit</a:t>
+            </a:r>
+          </a:p>
+        </p:txBody>
+      </p:sp>
+      <p:sp>
+        <p:nvSpPr>
+          <p:cNvPr id="49" name="TextBox 48">
+            <a:extLst>
+              <a:ext uri="{FF2B5EF4-FFF2-40B4-BE49-F238E27FC236}">
+                <a16:creationId xmlns:a16="http://schemas.microsoft.com/office/drawing/2014/main" id="{8FC528C1-5E62-4C23-B10C-FAB42B8C56D0}"/>
+              </a:ext>
+            </a:extLst>
+          </p:cNvPr>
+          <p:cNvSpPr txBox="1"/>
+          <p:nvPr/>
+        </p:nvSpPr>
+        <p:spPr>
+          <a:xfrm>
+            <a:off x="4656664" y="1662142"/>
+            <a:ext cx="928459" cy="369332"/>
+          </a:xfrm>
+          <a:prstGeom prst="rect">
+            <a:avLst/>
+          </a:prstGeom>
+          <a:noFill/>
+        </p:spPr>
+        <p:txBody>
+          <a:bodyPr wrap="none" rtlCol="0">
+            <a:spAutoFit/>
+          </a:bodyPr>
+          <a:lstStyle/>
+          <a:p>
+            <a:r>
+              <a:rPr lang="en-US" i="1">
+                <a:latin typeface="Arial" panose="020B0604020202020204" pitchFamily="34" charset="0"/>
+              </a:rPr>
+              <a:t>sample</a:t>
+            </a:r>
+          </a:p>
+        </p:txBody>
+      </p:sp>
+      <p:sp>
+        <p:nvSpPr>
+          <p:cNvPr id="51" name="TextBox 50">
+            <a:extLst>
+              <a:ext uri="{FF2B5EF4-FFF2-40B4-BE49-F238E27FC236}">
+                <a16:creationId xmlns:a16="http://schemas.microsoft.com/office/drawing/2014/main" id="{319B665E-B995-4406-8ADD-F5052C17F7DB}"/>
+              </a:ext>
+            </a:extLst>
+          </p:cNvPr>
+          <p:cNvSpPr txBox="1"/>
+          <p:nvPr/>
+        </p:nvSpPr>
+        <p:spPr>
+          <a:xfrm>
+            <a:off x="2683188" y="4013333"/>
+            <a:ext cx="915635" cy="369332"/>
+          </a:xfrm>
+          <a:prstGeom prst="rect">
+            <a:avLst/>
+          </a:prstGeom>
+          <a:noFill/>
+        </p:spPr>
+        <p:txBody>
+          <a:bodyPr wrap="none" rtlCol="0">
+            <a:spAutoFit/>
+          </a:bodyPr>
+          <a:lstStyle/>
+          <a:p>
+            <a:r>
+              <a:rPr lang="en-US" i="1">
+                <a:latin typeface="Arial" panose="020B0604020202020204" pitchFamily="34" charset="0"/>
+              </a:rPr>
+              <a:t>inspect</a:t>
+            </a:r>
+          </a:p>
+        </p:txBody>
+      </p:sp>
+      <p:sp>
+        <p:nvSpPr>
+          <p:cNvPr id="52" name="TextBox 51">
+            <a:extLst>
+              <a:ext uri="{FF2B5EF4-FFF2-40B4-BE49-F238E27FC236}">
+                <a16:creationId xmlns:a16="http://schemas.microsoft.com/office/drawing/2014/main" id="{4E320745-EE30-4269-BE03-11300B278EE4}"/>
+              </a:ext>
+            </a:extLst>
+          </p:cNvPr>
+          <p:cNvSpPr txBox="1"/>
+          <p:nvPr/>
+        </p:nvSpPr>
+        <p:spPr>
+          <a:xfrm>
+            <a:off x="4205277" y="4011253"/>
+            <a:ext cx="1056700" cy="369332"/>
+          </a:xfrm>
+          <a:prstGeom prst="rect">
+            <a:avLst/>
+          </a:prstGeom>
+          <a:noFill/>
+        </p:spPr>
+        <p:txBody>
+          <a:bodyPr wrap="none" rtlCol="0">
+            <a:spAutoFit/>
+          </a:bodyPr>
+          <a:lstStyle/>
+          <a:p>
+            <a:r>
+              <a:rPr lang="en-US" i="1">
+                <a:latin typeface="Arial" panose="020B0604020202020204" pitchFamily="34" charset="0"/>
+              </a:rPr>
+              <a:t>evaluate</a:t>
+            </a:r>
+          </a:p>
+        </p:txBody>
+      </p:sp>
+      <p:sp>
+        <p:nvSpPr>
+          <p:cNvPr id="59" name="Arc 58">
+            <a:extLst>
+              <a:ext uri="{FF2B5EF4-FFF2-40B4-BE49-F238E27FC236}">
+                <a16:creationId xmlns:a16="http://schemas.microsoft.com/office/drawing/2014/main" id="{176FE4E0-4287-4A82-80AB-702DF7543C37}"/>
+              </a:ext>
+            </a:extLst>
+          </p:cNvPr>
+          <p:cNvSpPr/>
+          <p:nvPr/>
+        </p:nvSpPr>
+        <p:spPr>
+          <a:xfrm>
+            <a:off x="3886200" y="2057400"/>
+            <a:ext cx="2743200" cy="2743200"/>
+          </a:xfrm>
+          <a:prstGeom prst="arc">
+            <a:avLst>
+              <a:gd name="adj1" fmla="val 3117121"/>
+              <a:gd name="adj2" fmla="val 18288764"/>
+            </a:avLst>
+          </a:prstGeom>
+          <a:ln w="38100">
+            <a:solidFill>
+              <a:schemeClr val="tx1"/>
+            </a:solidFill>
+            <a:tailEnd type="triangle" w="lg" len="lg"/>
+          </a:ln>
+        </p:spPr>
+        <p:style>
+          <a:lnRef idx="1">
+            <a:schemeClr val="accent1"/>
+          </a:lnRef>
+          <a:fillRef idx="0">
+            <a:schemeClr val="accent1"/>
+          </a:fillRef>
+          <a:effectRef idx="0">
+            <a:schemeClr val="accent1"/>
+          </a:effectRef>
+          <a:fontRef idx="minor">
+            <a:schemeClr val="tx1"/>
+          </a:fontRef>
+        </p:style>
+        <p:txBody>
+          <a:bodyPr rtlCol="0" anchor="ctr"/>
+          <a:lstStyle/>
+          <a:p>
+            <a:pPr algn="ctr"/>
+            <a:endParaRPr lang="en-US"/>
+          </a:p>
+        </p:txBody>
+      </p:sp>
+      <p:sp>
+        <p:nvSpPr>
+          <p:cNvPr id="12" name="Rectangle 11">
+            <a:extLst>
+              <a:ext uri="{FF2B5EF4-FFF2-40B4-BE49-F238E27FC236}">
+                <a16:creationId xmlns:a16="http://schemas.microsoft.com/office/drawing/2014/main" id="{4FEC00F9-78CD-4428-AE10-4D9168E4BD01}"/>
+              </a:ext>
+            </a:extLst>
+          </p:cNvPr>
+          <p:cNvSpPr/>
+          <p:nvPr/>
+        </p:nvSpPr>
+        <p:spPr>
+          <a:xfrm>
+            <a:off x="3337559" y="3108959"/>
+            <a:ext cx="1097280" cy="640080"/>
+          </a:xfrm>
+          <a:prstGeom prst="rect">
+            <a:avLst/>
+          </a:prstGeom>
+          <a:solidFill>
+            <a:schemeClr val="bg1"/>
+          </a:solidFill>
+          <a:ln>
+            <a:solidFill>
+              <a:schemeClr val="tx1"/>
+            </a:solidFill>
+          </a:ln>
+        </p:spPr>
+        <p:style>
+          <a:lnRef idx="2">
+            <a:schemeClr val="accent1">
+              <a:shade val="50000"/>
+            </a:schemeClr>
+          </a:lnRef>
+          <a:fillRef idx="1">
+            <a:schemeClr val="accent1"/>
+          </a:fillRef>
+          <a:effectRef idx="0">
+            <a:schemeClr val="accent1"/>
+          </a:effectRef>
+          <a:fontRef idx="minor">
+            <a:schemeClr val="lt1"/>
+          </a:fontRef>
+        </p:style>
+        <p:txBody>
+          <a:bodyPr rtlCol="0" anchor="ctr"/>
+          <a:lstStyle/>
+          <a:p>
+            <a:pPr algn="ctr"/>
+            <a:r>
+              <a:rPr lang="en-US">
+                <a:solidFill>
+                  <a:schemeClr val="tx1"/>
+                </a:solidFill>
+                <a:latin typeface="Arial" panose="020B0604020202020204" pitchFamily="34" charset="0"/>
+              </a:rPr>
+              <a:t>metrics</a:t>
+            </a:r>
+          </a:p>
+        </p:txBody>
+      </p:sp>
+      <p:sp>
+        <p:nvSpPr>
+          <p:cNvPr id="10" name="Rectangle 9">
+            <a:extLst>
+              <a:ext uri="{FF2B5EF4-FFF2-40B4-BE49-F238E27FC236}">
+                <a16:creationId xmlns:a16="http://schemas.microsoft.com/office/drawing/2014/main" id="{F7DDACE4-AB04-4E22-B379-97CCDC18FA46}"/>
+              </a:ext>
+            </a:extLst>
+          </p:cNvPr>
+          <p:cNvSpPr/>
+          <p:nvPr/>
+        </p:nvSpPr>
+        <p:spPr>
+          <a:xfrm>
+            <a:off x="5767326" y="3909353"/>
+            <a:ext cx="1097280" cy="640080"/>
+          </a:xfrm>
+          <a:prstGeom prst="rect">
+            <a:avLst/>
+          </a:prstGeom>
+          <a:solidFill>
+            <a:schemeClr val="bg1"/>
+          </a:solidFill>
+          <a:ln>
+            <a:solidFill>
+              <a:schemeClr val="tx1"/>
+            </a:solidFill>
+          </a:ln>
+        </p:spPr>
+        <p:style>
+          <a:lnRef idx="2">
+            <a:schemeClr val="accent1">
+              <a:shade val="50000"/>
+            </a:schemeClr>
+          </a:lnRef>
+          <a:fillRef idx="1">
+            <a:schemeClr val="accent1"/>
+          </a:fillRef>
+          <a:effectRef idx="0">
+            <a:schemeClr val="accent1"/>
+          </a:effectRef>
+          <a:fontRef idx="minor">
+            <a:schemeClr val="lt1"/>
+          </a:fontRef>
+        </p:style>
+        <p:txBody>
+          <a:bodyPr rtlCol="0" anchor="ctr"/>
+          <a:lstStyle/>
+          <a:p>
+            <a:pPr algn="ctr"/>
+            <a:r>
+              <a:rPr lang="en-US">
+                <a:solidFill>
+                  <a:schemeClr val="tx1"/>
+                </a:solidFill>
+                <a:latin typeface="Arial" panose="020B0604020202020204" pitchFamily="34" charset="0"/>
+              </a:rPr>
+              <a:t>trained pipeline</a:t>
+            </a:r>
+          </a:p>
+        </p:txBody>
+      </p:sp>
+      <p:sp>
+        <p:nvSpPr>
+          <p:cNvPr id="60" name="TextBox 59">
+            <a:extLst>
+              <a:ext uri="{FF2B5EF4-FFF2-40B4-BE49-F238E27FC236}">
+                <a16:creationId xmlns:a16="http://schemas.microsoft.com/office/drawing/2014/main" id="{C48C040D-2A80-415C-8F48-919B246F5B44}"/>
+              </a:ext>
+            </a:extLst>
+          </p:cNvPr>
+          <p:cNvSpPr txBox="1"/>
+          <p:nvPr/>
+        </p:nvSpPr>
+        <p:spPr>
+          <a:xfrm>
+            <a:off x="6209909" y="3381493"/>
+            <a:ext cx="364202" cy="369332"/>
+          </a:xfrm>
+          <a:prstGeom prst="rect">
+            <a:avLst/>
+          </a:prstGeom>
+          <a:noFill/>
+        </p:spPr>
+        <p:txBody>
+          <a:bodyPr wrap="none" rtlCol="0">
+            <a:spAutoFit/>
+          </a:bodyPr>
+          <a:lstStyle/>
+          <a:p>
+            <a:r>
+              <a:rPr lang="en-US" i="1">
+                <a:latin typeface="Arial" panose="020B0604020202020204" pitchFamily="34" charset="0"/>
+              </a:rPr>
+              <a:t>fit</a:t>
+            </a:r>
+          </a:p>
+        </p:txBody>
+      </p:sp>
+      <p:cxnSp>
+        <p:nvCxnSpPr>
+          <p:cNvPr id="61" name="Straight Arrow Connector 60">
+            <a:extLst>
+              <a:ext uri="{FF2B5EF4-FFF2-40B4-BE49-F238E27FC236}">
+                <a16:creationId xmlns:a16="http://schemas.microsoft.com/office/drawing/2014/main" id="{7354EEDA-8032-4DC5-A7E9-06AB0C916F0C}"/>
+              </a:ext>
+            </a:extLst>
+          </p:cNvPr>
+          <p:cNvCxnSpPr>
+            <a:cxnSpLocks/>
+          </p:cNvCxnSpPr>
+          <p:nvPr/>
+        </p:nvCxnSpPr>
+        <p:spPr>
+          <a:xfrm flipH="1">
+            <a:off x="6573606" y="3703864"/>
+            <a:ext cx="36744" cy="205489"/>
+          </a:xfrm>
+          <a:prstGeom prst="straightConnector1">
+            <a:avLst/>
+          </a:prstGeom>
+          <a:ln w="38100">
+            <a:solidFill>
+              <a:schemeClr val="tx1"/>
+            </a:solidFill>
+            <a:tailEnd type="triangle" w="lg" len="lg"/>
+          </a:ln>
+        </p:spPr>
+        <p:style>
+          <a:lnRef idx="1">
+            <a:schemeClr val="accent1"/>
+          </a:lnRef>
+          <a:fillRef idx="0">
+            <a:schemeClr val="accent1"/>
+          </a:fillRef>
+          <a:effectRef idx="0">
+            <a:schemeClr val="accent1"/>
+          </a:effectRef>
+          <a:fontRef idx="minor">
+            <a:schemeClr val="tx1"/>
+          </a:fontRef>
+        </p:style>
+      </p:cxnSp>
+      <p:cxnSp>
+        <p:nvCxnSpPr>
+          <p:cNvPr id="62" name="Straight Arrow Connector 61">
+            <a:extLst>
+              <a:ext uri="{FF2B5EF4-FFF2-40B4-BE49-F238E27FC236}">
+                <a16:creationId xmlns:a16="http://schemas.microsoft.com/office/drawing/2014/main" id="{ABBFC1DB-EE0E-4F95-8542-450C7C16BB62}"/>
+              </a:ext>
+            </a:extLst>
+          </p:cNvPr>
+          <p:cNvCxnSpPr>
+            <a:cxnSpLocks/>
+          </p:cNvCxnSpPr>
+          <p:nvPr/>
+        </p:nvCxnSpPr>
+        <p:spPr>
+          <a:xfrm flipH="1" flipV="1">
+            <a:off x="3918057" y="3749039"/>
+            <a:ext cx="76702" cy="209279"/>
+          </a:xfrm>
+          <a:prstGeom prst="straightConnector1">
+            <a:avLst/>
+          </a:prstGeom>
+          <a:ln w="38100">
+            <a:solidFill>
+              <a:schemeClr val="tx1"/>
+            </a:solidFill>
+            <a:tailEnd type="triangle" w="lg" len="lg"/>
+          </a:ln>
+        </p:spPr>
+        <p:style>
+          <a:lnRef idx="1">
+            <a:schemeClr val="accent1"/>
+          </a:lnRef>
+          <a:fillRef idx="0">
+            <a:schemeClr val="accent1"/>
+          </a:fillRef>
+          <a:effectRef idx="0">
+            <a:schemeClr val="accent1"/>
+          </a:effectRef>
+          <a:fontRef idx="minor">
+            <a:schemeClr val="tx1"/>
+          </a:fontRef>
+        </p:style>
+      </p:cxnSp>
+      <p:cxnSp>
+        <p:nvCxnSpPr>
+          <p:cNvPr id="28" name="Straight Arrow Connector 27">
+            <a:extLst>
+              <a:ext uri="{FF2B5EF4-FFF2-40B4-BE49-F238E27FC236}">
+                <a16:creationId xmlns:a16="http://schemas.microsoft.com/office/drawing/2014/main" id="{FFEBCD54-74DB-47FA-B972-BA420781349E}"/>
+              </a:ext>
+            </a:extLst>
+          </p:cNvPr>
+          <p:cNvCxnSpPr>
+            <a:cxnSpLocks/>
+          </p:cNvCxnSpPr>
+          <p:nvPr/>
+        </p:nvCxnSpPr>
+        <p:spPr>
+          <a:xfrm flipV="1">
+            <a:off x="2759529" y="2252601"/>
+            <a:ext cx="127907" cy="194436"/>
+          </a:xfrm>
+          <a:prstGeom prst="straightConnector1">
+            <a:avLst/>
+          </a:prstGeom>
+          <a:ln w="38100">
+            <a:solidFill>
+              <a:schemeClr val="tx1"/>
+            </a:solidFill>
+            <a:tailEnd type="triangle" w="lg" len="lg"/>
+          </a:ln>
+        </p:spPr>
+        <p:style>
+          <a:lnRef idx="1">
+            <a:schemeClr val="accent1"/>
+          </a:lnRef>
+          <a:fillRef idx="0">
+            <a:schemeClr val="accent1"/>
+          </a:fillRef>
+          <a:effectRef idx="0">
+            <a:schemeClr val="accent1"/>
+          </a:effectRef>
+          <a:fontRef idx="minor">
+            <a:schemeClr val="tx1"/>
+          </a:fontRef>
+        </p:style>
+      </p:cxnSp>
+      <p:sp>
+        <p:nvSpPr>
+          <p:cNvPr id="34" name="Rectangle 33">
+            <a:extLst>
+              <a:ext uri="{FF2B5EF4-FFF2-40B4-BE49-F238E27FC236}">
+                <a16:creationId xmlns:a16="http://schemas.microsoft.com/office/drawing/2014/main" id="{A4D3F4CD-D161-4813-B928-D7E26594F713}"/>
+              </a:ext>
+            </a:extLst>
+          </p:cNvPr>
+          <p:cNvSpPr/>
+          <p:nvPr/>
+        </p:nvSpPr>
+        <p:spPr>
+          <a:xfrm>
+            <a:off x="4350937" y="1028115"/>
+            <a:ext cx="1097280" cy="640080"/>
+          </a:xfrm>
+          <a:prstGeom prst="rect">
+            <a:avLst/>
+          </a:prstGeom>
+          <a:solidFill>
+            <a:srgbClr val="7EC0EF"/>
+          </a:solidFill>
+          <a:ln>
+            <a:solidFill>
+              <a:schemeClr val="tx1"/>
+            </a:solidFill>
+          </a:ln>
+        </p:spPr>
+        <p:style>
+          <a:lnRef idx="2">
+            <a:schemeClr val="accent1">
+              <a:shade val="50000"/>
+            </a:schemeClr>
+          </a:lnRef>
+          <a:fillRef idx="1">
+            <a:schemeClr val="accent1"/>
+          </a:fillRef>
+          <a:effectRef idx="0">
+            <a:schemeClr val="accent1"/>
+          </a:effectRef>
+          <a:fontRef idx="minor">
+            <a:schemeClr val="lt1"/>
+          </a:fontRef>
+        </p:style>
+        <p:txBody>
+          <a:bodyPr rtlCol="0" anchor="ctr"/>
+          <a:lstStyle/>
+          <a:p>
+            <a:pPr algn="ctr"/>
+            <a:r>
+              <a:rPr lang="en-US" sz="1500">
+                <a:solidFill>
+                  <a:schemeClr val="tx1"/>
+                </a:solidFill>
+                <a:latin typeface="Arial" panose="020B0604020202020204" pitchFamily="34" charset="0"/>
+              </a:rPr>
+              <a:t>optimizer search space</a:t>
+            </a:r>
+          </a:p>
+        </p:txBody>
+      </p:sp>
+      <p:sp>
+        <p:nvSpPr>
+          <p:cNvPr id="35" name="TextBox 34">
+            <a:extLst>
+              <a:ext uri="{FF2B5EF4-FFF2-40B4-BE49-F238E27FC236}">
+                <a16:creationId xmlns:a16="http://schemas.microsoft.com/office/drawing/2014/main" id="{D41FAD4F-8A9E-489D-8399-C44DBAE7BCE1}"/>
+              </a:ext>
+            </a:extLst>
+          </p:cNvPr>
+          <p:cNvSpPr txBox="1"/>
+          <p:nvPr/>
+        </p:nvSpPr>
+        <p:spPr>
+          <a:xfrm>
+            <a:off x="3231555" y="1050831"/>
+            <a:ext cx="941283" cy="369332"/>
+          </a:xfrm>
+          <a:prstGeom prst="rect">
+            <a:avLst/>
+          </a:prstGeom>
+          <a:noFill/>
+        </p:spPr>
+        <p:txBody>
+          <a:bodyPr wrap="none" rtlCol="0">
+            <a:spAutoFit/>
+          </a:bodyPr>
+          <a:lstStyle/>
+          <a:p>
+            <a:r>
+              <a:rPr lang="en-US" i="1">
+                <a:latin typeface="Arial" panose="020B0604020202020204" pitchFamily="34" charset="0"/>
+              </a:rPr>
+              <a:t>encode</a:t>
+            </a:r>
+          </a:p>
+        </p:txBody>
+      </p:sp>
+      <p:cxnSp>
+        <p:nvCxnSpPr>
+          <p:cNvPr id="31" name="Straight Arrow Connector 30">
+            <a:extLst>
+              <a:ext uri="{FF2B5EF4-FFF2-40B4-BE49-F238E27FC236}">
+                <a16:creationId xmlns:a16="http://schemas.microsoft.com/office/drawing/2014/main" id="{5A68D8FE-DEE8-4F36-A793-63C9C3FB353B}"/>
+              </a:ext>
+            </a:extLst>
+          </p:cNvPr>
+          <p:cNvCxnSpPr>
+            <a:cxnSpLocks/>
+          </p:cNvCxnSpPr>
+          <p:nvPr/>
+        </p:nvCxnSpPr>
+        <p:spPr>
+          <a:xfrm flipV="1">
+            <a:off x="4098471" y="1372959"/>
+            <a:ext cx="260157" cy="55790"/>
+          </a:xfrm>
+          <a:prstGeom prst="straightConnector1">
+            <a:avLst/>
+          </a:prstGeom>
+          <a:ln w="38100">
+            <a:solidFill>
+              <a:schemeClr val="tx1"/>
+            </a:solidFill>
+            <a:tailEnd type="triangle" w="lg" len="lg"/>
+          </a:ln>
+        </p:spPr>
+        <p:style>
+          <a:lnRef idx="1">
+            <a:schemeClr val="accent1"/>
+          </a:lnRef>
+          <a:fillRef idx="0">
+            <a:schemeClr val="accent1"/>
+          </a:fillRef>
+          <a:effectRef idx="0">
+            <a:schemeClr val="accent1"/>
+          </a:effectRef>
+          <a:fontRef idx="minor">
+            <a:schemeClr val="tx1"/>
+          </a:fontRef>
+        </p:style>
+      </p:cxnSp>
+      <p:sp>
+        <p:nvSpPr>
+          <p:cNvPr id="33" name="Rectangle 32">
+            <a:extLst>
+              <a:ext uri="{FF2B5EF4-FFF2-40B4-BE49-F238E27FC236}">
+                <a16:creationId xmlns:a16="http://schemas.microsoft.com/office/drawing/2014/main" id="{CBB8444C-623F-4F47-854D-6FC2E80FE39E}"/>
+              </a:ext>
+            </a:extLst>
+          </p:cNvPr>
+          <p:cNvSpPr/>
+          <p:nvPr/>
+        </p:nvSpPr>
+        <p:spPr>
+          <a:xfrm>
+            <a:off x="5585123" y="1791925"/>
+            <a:ext cx="1097280" cy="640080"/>
+          </a:xfrm>
+          <a:prstGeom prst="rect">
+            <a:avLst/>
+          </a:prstGeom>
+          <a:solidFill>
+            <a:srgbClr val="B0E2FF"/>
+          </a:solidFill>
+          <a:ln>
+            <a:solidFill>
+              <a:schemeClr val="tx1"/>
+            </a:solidFill>
+          </a:ln>
+        </p:spPr>
+        <p:style>
+          <a:lnRef idx="2">
+            <a:schemeClr val="accent1">
+              <a:shade val="50000"/>
+            </a:schemeClr>
+          </a:lnRef>
+          <a:fillRef idx="1">
+            <a:schemeClr val="accent1"/>
+          </a:fillRef>
+          <a:effectRef idx="0">
+            <a:schemeClr val="accent1"/>
+          </a:effectRef>
+          <a:fontRef idx="minor">
+            <a:schemeClr val="lt1"/>
+          </a:fontRef>
+        </p:style>
+        <p:txBody>
+          <a:bodyPr rtlCol="0" anchor="ctr"/>
+          <a:lstStyle/>
+          <a:p>
+            <a:pPr algn="ctr"/>
+            <a:r>
+              <a:rPr lang="en-US" sz="1500">
+                <a:solidFill>
+                  <a:schemeClr val="tx1"/>
+                </a:solidFill>
+                <a:latin typeface="Arial" panose="020B0604020202020204" pitchFamily="34" charset="0"/>
+              </a:rPr>
+              <a:t>point in search space</a:t>
+            </a:r>
+          </a:p>
+        </p:txBody>
+      </p:sp>
+      <p:cxnSp>
+        <p:nvCxnSpPr>
+          <p:cNvPr id="36" name="Straight Arrow Connector 35">
+            <a:extLst>
+              <a:ext uri="{FF2B5EF4-FFF2-40B4-BE49-F238E27FC236}">
+                <a16:creationId xmlns:a16="http://schemas.microsoft.com/office/drawing/2014/main" id="{EC55581B-4B99-471A-8782-795A89C60983}"/>
+              </a:ext>
+            </a:extLst>
+          </p:cNvPr>
+          <p:cNvCxnSpPr>
+            <a:cxnSpLocks/>
+          </p:cNvCxnSpPr>
+          <p:nvPr/>
+        </p:nvCxnSpPr>
+        <p:spPr>
+          <a:xfrm>
+            <a:off x="5611368" y="1652204"/>
+            <a:ext cx="213996" cy="135764"/>
+          </a:xfrm>
+          <a:prstGeom prst="straightConnector1">
+            <a:avLst/>
+          </a:prstGeom>
+          <a:ln w="38100">
+            <a:solidFill>
+              <a:schemeClr val="tx1"/>
+            </a:solidFill>
+            <a:tailEnd type="triangle" w="lg" len="lg"/>
+          </a:ln>
+        </p:spPr>
+        <p:style>
+          <a:lnRef idx="1">
+            <a:schemeClr val="accent1"/>
+          </a:lnRef>
+          <a:fillRef idx="0">
+            <a:schemeClr val="accent1"/>
+          </a:fillRef>
+          <a:effectRef idx="0">
+            <a:schemeClr val="accent1"/>
+          </a:effectRef>
+          <a:fontRef idx="minor">
+            <a:schemeClr val="tx1"/>
+          </a:fontRef>
+        </p:style>
+      </p:cxnSp>
+      <p:cxnSp>
+        <p:nvCxnSpPr>
+          <p:cNvPr id="39" name="Straight Arrow Connector 38">
+            <a:extLst>
+              <a:ext uri="{FF2B5EF4-FFF2-40B4-BE49-F238E27FC236}">
+                <a16:creationId xmlns:a16="http://schemas.microsoft.com/office/drawing/2014/main" id="{7B98946F-4BDA-45D8-A391-CEDEDE0D0DB5}"/>
+              </a:ext>
+            </a:extLst>
+          </p:cNvPr>
+          <p:cNvCxnSpPr>
+            <a:cxnSpLocks/>
+          </p:cNvCxnSpPr>
+          <p:nvPr/>
+        </p:nvCxnSpPr>
+        <p:spPr>
+          <a:xfrm>
+            <a:off x="6445706" y="2581410"/>
+            <a:ext cx="80280" cy="194080"/>
+          </a:xfrm>
+          <a:prstGeom prst="straightConnector1">
+            <a:avLst/>
+          </a:prstGeom>
+          <a:ln w="38100">
+            <a:solidFill>
+              <a:schemeClr val="tx1"/>
+            </a:solidFill>
+            <a:tailEnd type="triangle" w="lg" len="lg"/>
+          </a:ln>
+        </p:spPr>
+        <p:style>
+          <a:lnRef idx="1">
+            <a:schemeClr val="accent1"/>
+          </a:lnRef>
+          <a:fillRef idx="0">
+            <a:schemeClr val="accent1"/>
+          </a:fillRef>
+          <a:effectRef idx="0">
+            <a:schemeClr val="accent1"/>
+          </a:effectRef>
+          <a:fontRef idx="minor">
+            <a:schemeClr val="tx1"/>
+          </a:fontRef>
+        </p:style>
+      </p:cxnSp>
+      <p:sp>
+        <p:nvSpPr>
+          <p:cNvPr id="40" name="TextBox 39">
+            <a:extLst>
+              <a:ext uri="{FF2B5EF4-FFF2-40B4-BE49-F238E27FC236}">
+                <a16:creationId xmlns:a16="http://schemas.microsoft.com/office/drawing/2014/main" id="{8DC35226-5BE1-4EB4-9582-816A2689C3EA}"/>
+              </a:ext>
+            </a:extLst>
+          </p:cNvPr>
+          <p:cNvSpPr txBox="1"/>
+          <p:nvPr/>
+        </p:nvSpPr>
+        <p:spPr>
+          <a:xfrm>
+            <a:off x="5463378" y="2428673"/>
+            <a:ext cx="941283" cy="369332"/>
+          </a:xfrm>
+          <a:prstGeom prst="rect">
+            <a:avLst/>
+          </a:prstGeom>
+          <a:noFill/>
+        </p:spPr>
+        <p:txBody>
+          <a:bodyPr wrap="none" rtlCol="0">
+            <a:spAutoFit/>
+          </a:bodyPr>
+          <a:lstStyle/>
+          <a:p>
+            <a:r>
+              <a:rPr lang="en-US" i="1">
+                <a:latin typeface="Arial" panose="020B0604020202020204" pitchFamily="34" charset="0"/>
+              </a:rPr>
+              <a:t>decode</a:t>
+            </a:r>
+          </a:p>
+        </p:txBody>
+      </p:sp>
+    </p:spTree>
+    <p:extLst>
+      <p:ext uri="{BB962C8B-B14F-4D97-AF65-F5344CB8AC3E}">
+        <p14:creationId xmlns:p14="http://schemas.microsoft.com/office/powerpoint/2010/main" val="2884792959"/>
       </p:ext>
     </p:extLst>
   </p:cSld>

</xml_diff>

<commit_message>
In notebook 09_compat, added isinstance assertions so it can double as a test. In notebook 10_schemas, added a picture for encoding and decoding during search. Modernized installation instructions for Python 3.7. (#1145)
Signed-off-by: Martin Hirzel <hirzel@gmail.com>
</commit_message>
<xml_diff>
--- a/talks/2022-0816-lale.pptx
+++ b/talks/2022-0816-lale.pptx
@@ -5,9 +5,11 @@
     <p:sldMasterId id="2147483660" r:id="rId1"/>
   </p:sldMasterIdLst>
   <p:sldIdLst>
-    <p:sldId id="258" r:id="rId2"/>
-    <p:sldId id="257" r:id="rId3"/>
-    <p:sldId id="256" r:id="rId4"/>
+    <p:sldId id="259" r:id="rId2"/>
+    <p:sldId id="258" r:id="rId3"/>
+    <p:sldId id="257" r:id="rId4"/>
+    <p:sldId id="256" r:id="rId5"/>
+    <p:sldId id="260" r:id="rId6"/>
   </p:sldIdLst>
   <p:sldSz cx="9144000" cy="6858000" type="screen4x3"/>
   <p:notesSz cx="6858000" cy="9144000"/>
@@ -245,7 +247,7 @@
           <a:p>
             <a:fld id="{C3ED7C7B-A01C-4333-8566-9F1FF6A5213D}" type="datetimeFigureOut">
               <a:rPr lang="en-US" smtClean="0"/>
-              <a:t>7/29/2022</a:t>
+              <a:t>8/7/2022</a:t>
             </a:fld>
             <a:endParaRPr lang="en-US"/>
           </a:p>
@@ -415,7 +417,7 @@
           <a:p>
             <a:fld id="{C3ED7C7B-A01C-4333-8566-9F1FF6A5213D}" type="datetimeFigureOut">
               <a:rPr lang="en-US" smtClean="0"/>
-              <a:t>7/29/2022</a:t>
+              <a:t>8/7/2022</a:t>
             </a:fld>
             <a:endParaRPr lang="en-US"/>
           </a:p>
@@ -595,7 +597,7 @@
           <a:p>
             <a:fld id="{C3ED7C7B-A01C-4333-8566-9F1FF6A5213D}" type="datetimeFigureOut">
               <a:rPr lang="en-US" smtClean="0"/>
-              <a:t>7/29/2022</a:t>
+              <a:t>8/7/2022</a:t>
             </a:fld>
             <a:endParaRPr lang="en-US"/>
           </a:p>
@@ -765,7 +767,7 @@
           <a:p>
             <a:fld id="{C3ED7C7B-A01C-4333-8566-9F1FF6A5213D}" type="datetimeFigureOut">
               <a:rPr lang="en-US" smtClean="0"/>
-              <a:t>7/29/2022</a:t>
+              <a:t>8/7/2022</a:t>
             </a:fld>
             <a:endParaRPr lang="en-US"/>
           </a:p>
@@ -1009,7 +1011,7 @@
           <a:p>
             <a:fld id="{C3ED7C7B-A01C-4333-8566-9F1FF6A5213D}" type="datetimeFigureOut">
               <a:rPr lang="en-US" smtClean="0"/>
-              <a:t>7/29/2022</a:t>
+              <a:t>8/7/2022</a:t>
             </a:fld>
             <a:endParaRPr lang="en-US"/>
           </a:p>
@@ -1241,7 +1243,7 @@
           <a:p>
             <a:fld id="{C3ED7C7B-A01C-4333-8566-9F1FF6A5213D}" type="datetimeFigureOut">
               <a:rPr lang="en-US" smtClean="0"/>
-              <a:t>7/29/2022</a:t>
+              <a:t>8/7/2022</a:t>
             </a:fld>
             <a:endParaRPr lang="en-US"/>
           </a:p>
@@ -1608,7 +1610,7 @@
           <a:p>
             <a:fld id="{C3ED7C7B-A01C-4333-8566-9F1FF6A5213D}" type="datetimeFigureOut">
               <a:rPr lang="en-US" smtClean="0"/>
-              <a:t>7/29/2022</a:t>
+              <a:t>8/7/2022</a:t>
             </a:fld>
             <a:endParaRPr lang="en-US"/>
           </a:p>
@@ -1726,7 +1728,7 @@
           <a:p>
             <a:fld id="{C3ED7C7B-A01C-4333-8566-9F1FF6A5213D}" type="datetimeFigureOut">
               <a:rPr lang="en-US" smtClean="0"/>
-              <a:t>7/29/2022</a:t>
+              <a:t>8/7/2022</a:t>
             </a:fld>
             <a:endParaRPr lang="en-US"/>
           </a:p>
@@ -1821,7 +1823,7 @@
           <a:p>
             <a:fld id="{C3ED7C7B-A01C-4333-8566-9F1FF6A5213D}" type="datetimeFigureOut">
               <a:rPr lang="en-US" smtClean="0"/>
-              <a:t>7/29/2022</a:t>
+              <a:t>8/7/2022</a:t>
             </a:fld>
             <a:endParaRPr lang="en-US"/>
           </a:p>
@@ -2098,7 +2100,7 @@
           <a:p>
             <a:fld id="{C3ED7C7B-A01C-4333-8566-9F1FF6A5213D}" type="datetimeFigureOut">
               <a:rPr lang="en-US" smtClean="0"/>
-              <a:t>7/29/2022</a:t>
+              <a:t>8/7/2022</a:t>
             </a:fld>
             <a:endParaRPr lang="en-US"/>
           </a:p>
@@ -2355,7 +2357,7 @@
           <a:p>
             <a:fld id="{C3ED7C7B-A01C-4333-8566-9F1FF6A5213D}" type="datetimeFigureOut">
               <a:rPr lang="en-US" smtClean="0"/>
-              <a:t>7/29/2022</a:t>
+              <a:t>8/7/2022</a:t>
             </a:fld>
             <a:endParaRPr lang="en-US"/>
           </a:p>
@@ -2568,7 +2570,7 @@
           <a:p>
             <a:fld id="{C3ED7C7B-A01C-4333-8566-9F1FF6A5213D}" type="datetimeFigureOut">
               <a:rPr lang="en-US" smtClean="0"/>
-              <a:t>7/29/2022</a:t>
+              <a:t>8/7/2022</a:t>
             </a:fld>
             <a:endParaRPr lang="en-US"/>
           </a:p>
@@ -2957,6 +2959,73 @@
 </file>
 
 <file path=ppt/slides/slide1.xml><?xml version="1.0" encoding="utf-8"?>
+<p:sld xmlns:a="http://schemas.openxmlformats.org/drawingml/2006/main" xmlns:r="http://schemas.openxmlformats.org/officeDocument/2006/relationships" xmlns:p="http://schemas.openxmlformats.org/presentationml/2006/main">
+  <p:cSld>
+    <p:spTree>
+      <p:nvGrpSpPr>
+        <p:cNvPr id="1" name=""/>
+        <p:cNvGrpSpPr/>
+        <p:nvPr/>
+      </p:nvGrpSpPr>
+      <p:grpSpPr>
+        <a:xfrm>
+          <a:off x="0" y="0"/>
+          <a:ext cx="0" cy="0"/>
+          <a:chOff x="0" y="0"/>
+          <a:chExt cx="0" cy="0"/>
+        </a:xfrm>
+      </p:grpSpPr>
+      <p:sp>
+        <p:nvSpPr>
+          <p:cNvPr id="4" name="TextBox 3">
+            <a:extLst>
+              <a:ext uri="{FF2B5EF4-FFF2-40B4-BE49-F238E27FC236}">
+                <a16:creationId xmlns:a16="http://schemas.microsoft.com/office/drawing/2014/main" id="{334FC6D5-7E5C-412A-A9A5-A21E557B3F49}"/>
+              </a:ext>
+            </a:extLst>
+          </p:cNvPr>
+          <p:cNvSpPr txBox="1"/>
+          <p:nvPr/>
+        </p:nvSpPr>
+        <p:spPr>
+          <a:xfrm>
+            <a:off x="1708660" y="1490008"/>
+            <a:ext cx="5726680" cy="1938992"/>
+          </a:xfrm>
+          <a:prstGeom prst="rect">
+            <a:avLst/>
+          </a:prstGeom>
+          <a:noFill/>
+        </p:spPr>
+        <p:txBody>
+          <a:bodyPr wrap="square" rtlCol="0">
+            <a:spAutoFit/>
+          </a:bodyPr>
+          <a:lstStyle/>
+          <a:p>
+            <a:r>
+              <a:rPr lang="en-US" sz="2400">
+                <a:latin typeface="Arial" panose="020B0604020202020204" pitchFamily="34" charset="0"/>
+              </a:rPr>
+              <a:t>This file contains drawings used in our KDD tutorial. The slides are not intended to be presented or understood out of context. Instead, please take a look at the tutorial notebooks.</a:t>
+            </a:r>
+          </a:p>
+        </p:txBody>
+      </p:sp>
+    </p:spTree>
+    <p:extLst>
+      <p:ext uri="{BB962C8B-B14F-4D97-AF65-F5344CB8AC3E}">
+        <p14:creationId xmlns:p14="http://schemas.microsoft.com/office/powerpoint/2010/main" val="2834257382"/>
+      </p:ext>
+    </p:extLst>
+  </p:cSld>
+  <p:clrMapOvr>
+    <a:masterClrMapping/>
+  </p:clrMapOvr>
+</p:sld>
+</file>
+
+<file path=ppt/slides/slide2.xml><?xml version="1.0" encoding="utf-8"?>
 <p:sld xmlns:a="http://schemas.openxmlformats.org/drawingml/2006/main" xmlns:r="http://schemas.openxmlformats.org/officeDocument/2006/relationships" xmlns:p="http://schemas.openxmlformats.org/presentationml/2006/main">
   <p:cSld>
     <p:spTree>
@@ -4164,7 +4233,7 @@
 </p:sld>
 </file>
 
-<file path=ppt/slides/slide2.xml><?xml version="1.0" encoding="utf-8"?>
+<file path=ppt/slides/slide3.xml><?xml version="1.0" encoding="utf-8"?>
 <p:sld xmlns:a="http://schemas.openxmlformats.org/drawingml/2006/main" xmlns:r="http://schemas.openxmlformats.org/officeDocument/2006/relationships" xmlns:p="http://schemas.openxmlformats.org/presentationml/2006/main">
   <p:cSld>
     <p:spTree>
@@ -5425,7 +5494,7 @@
 </p:sld>
 </file>
 
-<file path=ppt/slides/slide3.xml><?xml version="1.0" encoding="utf-8"?>
+<file path=ppt/slides/slide4.xml><?xml version="1.0" encoding="utf-8"?>
 <p:sld xmlns:a="http://schemas.openxmlformats.org/drawingml/2006/main" xmlns:r="http://schemas.openxmlformats.org/officeDocument/2006/relationships" xmlns:p="http://schemas.openxmlformats.org/presentationml/2006/main">
   <p:cSld>
     <p:spTree>
@@ -5571,7 +5640,7 @@
         </p:nvSpPr>
         <p:spPr>
           <a:xfrm>
-            <a:off x="3509398" y="1186002"/>
+            <a:off x="3625748" y="1058014"/>
             <a:ext cx="1097280" cy="640080"/>
           </a:xfrm>
           <a:prstGeom prst="rect">
@@ -6232,57 +6301,13 @@
         </p:nvCxnSpPr>
         <p:spPr>
           <a:xfrm>
-            <a:off x="6239143" y="2209920"/>
-            <a:ext cx="59841" cy="98647"/>
+            <a:off x="6165396" y="2126796"/>
+            <a:ext cx="133588" cy="181771"/>
           </a:xfrm>
           <a:prstGeom prst="straightConnector1">
             <a:avLst/>
           </a:prstGeom>
           <a:ln w="38100">
-            <a:solidFill>
-              <a:schemeClr val="tx1"/>
-            </a:solidFill>
-            <a:tailEnd type="triangle" w="lg" len="lg"/>
-          </a:ln>
-        </p:spPr>
-        <p:style>
-          <a:lnRef idx="1">
-            <a:schemeClr val="accent1"/>
-          </a:lnRef>
-          <a:fillRef idx="0">
-            <a:schemeClr val="accent1"/>
-          </a:fillRef>
-          <a:effectRef idx="0">
-            <a:schemeClr val="accent1"/>
-          </a:effectRef>
-          <a:fontRef idx="minor">
-            <a:schemeClr val="tx1"/>
-          </a:fontRef>
-        </p:style>
-      </p:cxnSp>
-      <p:cxnSp>
-        <p:nvCxnSpPr>
-          <p:cNvPr id="44" name="Straight Arrow Connector 43">
-            <a:extLst>
-              <a:ext uri="{FF2B5EF4-FFF2-40B4-BE49-F238E27FC236}">
-                <a16:creationId xmlns:a16="http://schemas.microsoft.com/office/drawing/2014/main" id="{B0156708-E1D3-4D94-8384-FF73E16BB45E}"/>
-              </a:ext>
-            </a:extLst>
-          </p:cNvPr>
-          <p:cNvCxnSpPr>
-            <a:cxnSpLocks/>
-          </p:cNvCxnSpPr>
-          <p:nvPr/>
-        </p:nvCxnSpPr>
-        <p:spPr>
-          <a:xfrm flipV="1">
-            <a:off x="3370489" y="1664578"/>
-            <a:ext cx="137548" cy="94825"/>
-          </a:xfrm>
-          <a:prstGeom prst="straightConnector1">
-            <a:avLst/>
-          </a:prstGeom>
-          <a:ln w="25400">
             <a:solidFill>
               <a:schemeClr val="tx1"/>
             </a:solidFill>
@@ -6433,7 +6458,7 @@
         </p:nvSpPr>
         <p:spPr>
           <a:xfrm>
-            <a:off x="2404634" y="1738511"/>
+            <a:off x="2415430" y="1770534"/>
             <a:ext cx="556563" cy="369332"/>
           </a:xfrm>
           <a:prstGeom prst="rect">
@@ -6470,7 +6495,7 @@
         </p:nvSpPr>
         <p:spPr>
           <a:xfrm>
-            <a:off x="4751170" y="1695203"/>
+            <a:off x="4899577" y="1691055"/>
             <a:ext cx="928459" cy="369332"/>
           </a:xfrm>
           <a:prstGeom prst="rect">
@@ -6797,8 +6822,8 @@
         </p:nvCxnSpPr>
         <p:spPr>
           <a:xfrm flipH="1">
-            <a:off x="6554050" y="3765156"/>
-            <a:ext cx="36263" cy="144197"/>
+            <a:off x="6573606" y="3703864"/>
+            <a:ext cx="36744" cy="205489"/>
           </a:xfrm>
           <a:prstGeom prst="straightConnector1">
             <a:avLst/>
@@ -6841,8 +6866,52 @@
         </p:nvCxnSpPr>
         <p:spPr>
           <a:xfrm flipH="1" flipV="1">
-            <a:off x="3924862" y="3749039"/>
-            <a:ext cx="49883" cy="143965"/>
+            <a:off x="3918057" y="3749039"/>
+            <a:ext cx="76702" cy="209279"/>
+          </a:xfrm>
+          <a:prstGeom prst="straightConnector1">
+            <a:avLst/>
+          </a:prstGeom>
+          <a:ln w="38100">
+            <a:solidFill>
+              <a:schemeClr val="tx1"/>
+            </a:solidFill>
+            <a:tailEnd type="triangle" w="lg" len="lg"/>
+          </a:ln>
+        </p:spPr>
+        <p:style>
+          <a:lnRef idx="1">
+            <a:schemeClr val="accent1"/>
+          </a:lnRef>
+          <a:fillRef idx="0">
+            <a:schemeClr val="accent1"/>
+          </a:fillRef>
+          <a:effectRef idx="0">
+            <a:schemeClr val="accent1"/>
+          </a:effectRef>
+          <a:fontRef idx="minor">
+            <a:schemeClr val="tx1"/>
+          </a:fontRef>
+        </p:style>
+      </p:cxnSp>
+      <p:cxnSp>
+        <p:nvCxnSpPr>
+          <p:cNvPr id="28" name="Straight Arrow Connector 27">
+            <a:extLst>
+              <a:ext uri="{FF2B5EF4-FFF2-40B4-BE49-F238E27FC236}">
+                <a16:creationId xmlns:a16="http://schemas.microsoft.com/office/drawing/2014/main" id="{FFEBCD54-74DB-47FA-B972-BA420781349E}"/>
+              </a:ext>
+            </a:extLst>
+          </p:cNvPr>
+          <p:cNvCxnSpPr>
+            <a:cxnSpLocks/>
+          </p:cNvCxnSpPr>
+          <p:nvPr/>
+        </p:nvCxnSpPr>
+        <p:spPr>
+          <a:xfrm flipV="1">
+            <a:off x="3414032" y="1586093"/>
+            <a:ext cx="211716" cy="145890"/>
           </a:xfrm>
           <a:prstGeom prst="straightConnector1">
             <a:avLst/>
@@ -6873,6 +6942,1793 @@
     <p:extLst>
       <p:ext uri="{BB962C8B-B14F-4D97-AF65-F5344CB8AC3E}">
         <p14:creationId xmlns:p14="http://schemas.microsoft.com/office/powerpoint/2010/main" val="2087150795"/>
+      </p:ext>
+    </p:extLst>
+  </p:cSld>
+  <p:clrMapOvr>
+    <a:masterClrMapping/>
+  </p:clrMapOvr>
+</p:sld>
+</file>
+
+<file path=ppt/slides/slide5.xml><?xml version="1.0" encoding="utf-8"?>
+<p:sld xmlns:a="http://schemas.openxmlformats.org/drawingml/2006/main" xmlns:r="http://schemas.openxmlformats.org/officeDocument/2006/relationships" xmlns:p="http://schemas.openxmlformats.org/presentationml/2006/main">
+  <p:cSld>
+    <p:spTree>
+      <p:nvGrpSpPr>
+        <p:cNvPr id="1" name=""/>
+        <p:cNvGrpSpPr/>
+        <p:nvPr/>
+      </p:nvGrpSpPr>
+      <p:grpSpPr>
+        <a:xfrm>
+          <a:off x="0" y="0"/>
+          <a:ext cx="0" cy="0"/>
+          <a:chOff x="0" y="0"/>
+          <a:chExt cx="0" cy="0"/>
+        </a:xfrm>
+      </p:grpSpPr>
+      <p:sp>
+        <p:nvSpPr>
+          <p:cNvPr id="6" name="Arc 5">
+            <a:extLst>
+              <a:ext uri="{FF2B5EF4-FFF2-40B4-BE49-F238E27FC236}">
+                <a16:creationId xmlns:a16="http://schemas.microsoft.com/office/drawing/2014/main" id="{BB659DBD-B989-468A-B0BC-D80E8CEA958F}"/>
+              </a:ext>
+            </a:extLst>
+          </p:cNvPr>
+          <p:cNvSpPr/>
+          <p:nvPr/>
+        </p:nvSpPr>
+        <p:spPr>
+          <a:xfrm>
+            <a:off x="2514600" y="1371600"/>
+            <a:ext cx="4114800" cy="4114800"/>
+          </a:xfrm>
+          <a:prstGeom prst="arc">
+            <a:avLst>
+              <a:gd name="adj1" fmla="val 11773828"/>
+              <a:gd name="adj2" fmla="val 10173614"/>
+            </a:avLst>
+          </a:prstGeom>
+          <a:ln w="38100">
+            <a:solidFill>
+              <a:schemeClr val="tx1"/>
+            </a:solidFill>
+            <a:tailEnd type="triangle" w="lg" len="lg"/>
+          </a:ln>
+        </p:spPr>
+        <p:style>
+          <a:lnRef idx="1">
+            <a:schemeClr val="accent1"/>
+          </a:lnRef>
+          <a:fillRef idx="0">
+            <a:schemeClr val="accent1"/>
+          </a:fillRef>
+          <a:effectRef idx="0">
+            <a:schemeClr val="accent1"/>
+          </a:effectRef>
+          <a:fontRef idx="minor">
+            <a:schemeClr val="tx1"/>
+          </a:fontRef>
+        </p:style>
+        <p:txBody>
+          <a:bodyPr rtlCol="0" anchor="ctr"/>
+          <a:lstStyle/>
+          <a:p>
+            <a:pPr algn="ctr"/>
+            <a:endParaRPr lang="en-US"/>
+          </a:p>
+        </p:txBody>
+      </p:sp>
+      <p:sp>
+        <p:nvSpPr>
+          <p:cNvPr id="11" name="Rectangle 10">
+            <a:extLst>
+              <a:ext uri="{FF2B5EF4-FFF2-40B4-BE49-F238E27FC236}">
+                <a16:creationId xmlns:a16="http://schemas.microsoft.com/office/drawing/2014/main" id="{7A2DAAF4-ABC5-4C89-85BC-E297B70D092E}"/>
+              </a:ext>
+            </a:extLst>
+          </p:cNvPr>
+          <p:cNvSpPr/>
+          <p:nvPr/>
+        </p:nvSpPr>
+        <p:spPr>
+          <a:xfrm>
+            <a:off x="6110793" y="2787962"/>
+            <a:ext cx="1097280" cy="640080"/>
+          </a:xfrm>
+          <a:prstGeom prst="rect">
+            <a:avLst/>
+          </a:prstGeom>
+          <a:solidFill>
+            <a:srgbClr val="B0E2FF"/>
+          </a:solidFill>
+          <a:ln>
+            <a:solidFill>
+              <a:schemeClr val="tx1"/>
+            </a:solidFill>
+          </a:ln>
+        </p:spPr>
+        <p:style>
+          <a:lnRef idx="2">
+            <a:schemeClr val="accent1">
+              <a:shade val="50000"/>
+            </a:schemeClr>
+          </a:lnRef>
+          <a:fillRef idx="1">
+            <a:schemeClr val="accent1"/>
+          </a:fillRef>
+          <a:effectRef idx="0">
+            <a:schemeClr val="accent1"/>
+          </a:effectRef>
+          <a:fontRef idx="minor">
+            <a:schemeClr val="lt1"/>
+          </a:fontRef>
+        </p:style>
+        <p:txBody>
+          <a:bodyPr rtlCol="0" anchor="ctr"/>
+          <a:lstStyle/>
+          <a:p>
+            <a:pPr algn="ctr"/>
+            <a:r>
+              <a:rPr lang="en-US">
+                <a:solidFill>
+                  <a:schemeClr val="tx1"/>
+                </a:solidFill>
+                <a:latin typeface="Arial" panose="020B0604020202020204" pitchFamily="34" charset="0"/>
+              </a:rPr>
+              <a:t>trainable pipeline</a:t>
+            </a:r>
+          </a:p>
+        </p:txBody>
+      </p:sp>
+      <p:sp>
+        <p:nvSpPr>
+          <p:cNvPr id="13" name="Rectangle 12">
+            <a:extLst>
+              <a:ext uri="{FF2B5EF4-FFF2-40B4-BE49-F238E27FC236}">
+                <a16:creationId xmlns:a16="http://schemas.microsoft.com/office/drawing/2014/main" id="{44E6BB94-EE4A-4D82-8D8F-BD1F5A69F4B9}"/>
+              </a:ext>
+            </a:extLst>
+          </p:cNvPr>
+          <p:cNvSpPr/>
+          <p:nvPr/>
+        </p:nvSpPr>
+        <p:spPr>
+          <a:xfrm>
+            <a:off x="2682915" y="1612521"/>
+            <a:ext cx="1097280" cy="640080"/>
+          </a:xfrm>
+          <a:prstGeom prst="rect">
+            <a:avLst/>
+          </a:prstGeom>
+          <a:solidFill>
+            <a:srgbClr val="7EC0EF"/>
+          </a:solidFill>
+          <a:ln>
+            <a:solidFill>
+              <a:schemeClr val="tx1"/>
+            </a:solidFill>
+          </a:ln>
+        </p:spPr>
+        <p:style>
+          <a:lnRef idx="2">
+            <a:schemeClr val="accent1">
+              <a:shade val="50000"/>
+            </a:schemeClr>
+          </a:lnRef>
+          <a:fillRef idx="1">
+            <a:schemeClr val="accent1"/>
+          </a:fillRef>
+          <a:effectRef idx="0">
+            <a:schemeClr val="accent1"/>
+          </a:effectRef>
+          <a:fontRef idx="minor">
+            <a:schemeClr val="lt1"/>
+          </a:fontRef>
+        </p:style>
+        <p:txBody>
+          <a:bodyPr rtlCol="0" anchor="ctr"/>
+          <a:lstStyle/>
+          <a:p>
+            <a:pPr algn="ctr"/>
+            <a:r>
+              <a:rPr lang="en-US">
+                <a:solidFill>
+                  <a:schemeClr val="tx1"/>
+                </a:solidFill>
+                <a:latin typeface="Arial" panose="020B0604020202020204" pitchFamily="34" charset="0"/>
+              </a:rPr>
+              <a:t>planned pipeline</a:t>
+            </a:r>
+          </a:p>
+        </p:txBody>
+      </p:sp>
+      <p:grpSp>
+        <p:nvGrpSpPr>
+          <p:cNvPr id="22" name="Group 17">
+            <a:extLst>
+              <a:ext uri="{FF2B5EF4-FFF2-40B4-BE49-F238E27FC236}">
+                <a16:creationId xmlns:a16="http://schemas.microsoft.com/office/drawing/2014/main" id="{BAB1607B-285B-4525-9C5C-282B9313ABB1}"/>
+              </a:ext>
+            </a:extLst>
+          </p:cNvPr>
+          <p:cNvGrpSpPr>
+            <a:grpSpLocks noChangeAspect="1"/>
+          </p:cNvGrpSpPr>
+          <p:nvPr/>
+        </p:nvGrpSpPr>
+        <p:grpSpPr bwMode="auto">
+          <a:xfrm>
+            <a:off x="1902907" y="2799676"/>
+            <a:ext cx="1097280" cy="1532965"/>
+            <a:chOff x="924868" y="2313973"/>
+            <a:chExt cx="1188720" cy="1659573"/>
+          </a:xfrm>
+        </p:grpSpPr>
+        <p:sp>
+          <p:nvSpPr>
+            <p:cNvPr id="23" name="Arc 22">
+              <a:extLst>
+                <a:ext uri="{FF2B5EF4-FFF2-40B4-BE49-F238E27FC236}">
+                  <a16:creationId xmlns:a16="http://schemas.microsoft.com/office/drawing/2014/main" id="{7817B56E-4927-4934-BCA1-037565B950B7}"/>
+                </a:ext>
+              </a:extLst>
+            </p:cNvPr>
+            <p:cNvSpPr/>
+            <p:nvPr/>
+          </p:nvSpPr>
+          <p:spPr>
+            <a:xfrm>
+              <a:off x="1244296" y="2313973"/>
+              <a:ext cx="549862" cy="547898"/>
+            </a:xfrm>
+            <a:prstGeom prst="arc">
+              <a:avLst>
+                <a:gd name="adj1" fmla="val 7390944"/>
+                <a:gd name="adj2" fmla="val 3400725"/>
+              </a:avLst>
+            </a:prstGeom>
+            <a:ln>
+              <a:solidFill>
+                <a:schemeClr val="tx1"/>
+              </a:solidFill>
+            </a:ln>
+            <a:effectLst/>
+          </p:spPr>
+          <p:style>
+            <a:lnRef idx="2">
+              <a:schemeClr val="accent1"/>
+            </a:lnRef>
+            <a:fillRef idx="0">
+              <a:schemeClr val="accent1"/>
+            </a:fillRef>
+            <a:effectRef idx="1">
+              <a:schemeClr val="accent1"/>
+            </a:effectRef>
+            <a:fontRef idx="minor">
+              <a:schemeClr val="tx1"/>
+            </a:fontRef>
+          </p:style>
+          <p:txBody>
+            <a:bodyPr anchor="ctr"/>
+            <a:lstStyle/>
+            <a:p>
+              <a:pPr marL="0" marR="0" lvl="0" indent="0" algn="ctr" defTabSz="457200" rtl="0" eaLnBrk="0" fontAlgn="base" latinLnBrk="0" hangingPunct="0">
+                <a:lnSpc>
+                  <a:spcPct val="100000"/>
+                </a:lnSpc>
+                <a:spcBef>
+                  <a:spcPct val="0"/>
+                </a:spcBef>
+                <a:spcAft>
+                  <a:spcPct val="0"/>
+                </a:spcAft>
+                <a:buClrTx/>
+                <a:buSzTx/>
+                <a:buFontTx/>
+                <a:buNone/>
+                <a:tabLst/>
+                <a:defRPr/>
+              </a:pPr>
+              <a:endParaRPr kumimoji="0" lang="en-US" sz="1800" b="0" i="0" u="none" strike="noStrike" kern="1200" cap="none" spc="0" normalizeH="0" noProof="0">
+                <a:ln>
+                  <a:noFill/>
+                </a:ln>
+                <a:effectLst/>
+                <a:uLnTx/>
+                <a:uFillTx/>
+                <a:latin typeface="Arial" panose="020B0604020202020204" pitchFamily="34" charset="0"/>
+                <a:ea typeface="+mn-ea"/>
+                <a:cs typeface="+mn-cs"/>
+              </a:endParaRPr>
+            </a:p>
+          </p:txBody>
+        </p:sp>
+        <p:sp>
+          <p:nvSpPr>
+            <p:cNvPr id="24" name="Arc 23">
+              <a:extLst>
+                <a:ext uri="{FF2B5EF4-FFF2-40B4-BE49-F238E27FC236}">
+                  <a16:creationId xmlns:a16="http://schemas.microsoft.com/office/drawing/2014/main" id="{6D30EBA6-DC5D-436D-894E-F61E3B202027}"/>
+                </a:ext>
+              </a:extLst>
+            </p:cNvPr>
+            <p:cNvSpPr/>
+            <p:nvPr/>
+          </p:nvSpPr>
+          <p:spPr>
+            <a:xfrm>
+              <a:off x="924868" y="2784053"/>
+              <a:ext cx="1188720" cy="1189493"/>
+            </a:xfrm>
+            <a:prstGeom prst="arc">
+              <a:avLst>
+                <a:gd name="adj1" fmla="val 10753943"/>
+                <a:gd name="adj2" fmla="val 15185757"/>
+              </a:avLst>
+            </a:prstGeom>
+            <a:noFill/>
+            <a:ln>
+              <a:solidFill>
+                <a:schemeClr val="tx1"/>
+              </a:solidFill>
+            </a:ln>
+            <a:effectLst/>
+          </p:spPr>
+          <p:style>
+            <a:lnRef idx="2">
+              <a:schemeClr val="accent1"/>
+            </a:lnRef>
+            <a:fillRef idx="0">
+              <a:schemeClr val="accent1"/>
+            </a:fillRef>
+            <a:effectRef idx="1">
+              <a:schemeClr val="accent1"/>
+            </a:effectRef>
+            <a:fontRef idx="minor">
+              <a:schemeClr val="tx1"/>
+            </a:fontRef>
+          </p:style>
+          <p:txBody>
+            <a:bodyPr anchor="ctr"/>
+            <a:lstStyle/>
+            <a:p>
+              <a:pPr marL="0" marR="0" lvl="0" indent="0" algn="ctr" defTabSz="457200" rtl="0" eaLnBrk="0" fontAlgn="base" latinLnBrk="0" hangingPunct="0">
+                <a:lnSpc>
+                  <a:spcPct val="100000"/>
+                </a:lnSpc>
+                <a:spcBef>
+                  <a:spcPct val="0"/>
+                </a:spcBef>
+                <a:spcAft>
+                  <a:spcPct val="0"/>
+                </a:spcAft>
+                <a:buClrTx/>
+                <a:buSzTx/>
+                <a:buFontTx/>
+                <a:buNone/>
+                <a:tabLst/>
+                <a:defRPr/>
+              </a:pPr>
+              <a:endParaRPr kumimoji="0" lang="en-US" sz="1800" b="0" i="0" u="none" strike="noStrike" kern="1200" cap="none" spc="0" normalizeH="0" noProof="0">
+                <a:ln>
+                  <a:noFill/>
+                </a:ln>
+                <a:effectLst/>
+                <a:uLnTx/>
+                <a:uFillTx/>
+                <a:latin typeface="Arial" panose="020B0604020202020204" pitchFamily="34" charset="0"/>
+                <a:ea typeface="+mn-ea"/>
+                <a:cs typeface="+mn-cs"/>
+              </a:endParaRPr>
+            </a:p>
+          </p:txBody>
+        </p:sp>
+        <p:sp>
+          <p:nvSpPr>
+            <p:cNvPr id="25" name="Arc 24">
+              <a:extLst>
+                <a:ext uri="{FF2B5EF4-FFF2-40B4-BE49-F238E27FC236}">
+                  <a16:creationId xmlns:a16="http://schemas.microsoft.com/office/drawing/2014/main" id="{DE23F581-9378-4092-98FD-87AF86D2F9BA}"/>
+                </a:ext>
+              </a:extLst>
+            </p:cNvPr>
+            <p:cNvSpPr/>
+            <p:nvPr/>
+          </p:nvSpPr>
+          <p:spPr>
+            <a:xfrm>
+              <a:off x="924868" y="2784053"/>
+              <a:ext cx="1188720" cy="1189493"/>
+            </a:xfrm>
+            <a:prstGeom prst="arc">
+              <a:avLst>
+                <a:gd name="adj1" fmla="val 17167860"/>
+                <a:gd name="adj2" fmla="val 22496"/>
+              </a:avLst>
+            </a:prstGeom>
+            <a:noFill/>
+            <a:ln>
+              <a:solidFill>
+                <a:schemeClr val="tx1"/>
+              </a:solidFill>
+            </a:ln>
+            <a:effectLst/>
+          </p:spPr>
+          <p:style>
+            <a:lnRef idx="2">
+              <a:schemeClr val="accent1"/>
+            </a:lnRef>
+            <a:fillRef idx="0">
+              <a:schemeClr val="accent1"/>
+            </a:fillRef>
+            <a:effectRef idx="1">
+              <a:schemeClr val="accent1"/>
+            </a:effectRef>
+            <a:fontRef idx="minor">
+              <a:schemeClr val="tx1"/>
+            </a:fontRef>
+          </p:style>
+          <p:txBody>
+            <a:bodyPr wrap="none" anchor="ctr"/>
+            <a:lstStyle/>
+            <a:p>
+              <a:pPr marL="0" marR="0" lvl="0" indent="0" algn="ctr" defTabSz="457200" rtl="0" eaLnBrk="0" fontAlgn="base" latinLnBrk="0" hangingPunct="0">
+                <a:lnSpc>
+                  <a:spcPct val="100000"/>
+                </a:lnSpc>
+                <a:spcBef>
+                  <a:spcPct val="0"/>
+                </a:spcBef>
+                <a:spcAft>
+                  <a:spcPct val="0"/>
+                </a:spcAft>
+                <a:buClrTx/>
+                <a:buSzTx/>
+                <a:buFontTx/>
+                <a:buNone/>
+                <a:tabLst/>
+                <a:defRPr/>
+              </a:pPr>
+              <a:endParaRPr kumimoji="0" lang="en-US" sz="1800" b="0" i="0" u="none" strike="noStrike" kern="1200" cap="none" spc="0" normalizeH="0" noProof="0" dirty="0">
+                <a:ln>
+                  <a:noFill/>
+                </a:ln>
+                <a:effectLst/>
+                <a:uLnTx/>
+                <a:uFillTx/>
+                <a:latin typeface="Arial" panose="020B0604020202020204" pitchFamily="34" charset="0"/>
+                <a:ea typeface="+mn-ea"/>
+                <a:cs typeface="+mn-cs"/>
+              </a:endParaRPr>
+            </a:p>
+          </p:txBody>
+        </p:sp>
+        <p:sp>
+          <p:nvSpPr>
+            <p:cNvPr id="26" name="TextBox 7175">
+              <a:extLst>
+                <a:ext uri="{FF2B5EF4-FFF2-40B4-BE49-F238E27FC236}">
+                  <a16:creationId xmlns:a16="http://schemas.microsoft.com/office/drawing/2014/main" id="{6C75E26E-5618-4BDB-BA86-7D301F902057}"/>
+                </a:ext>
+              </a:extLst>
+            </p:cNvPr>
+            <p:cNvSpPr txBox="1">
+              <a:spLocks noChangeArrowheads="1"/>
+            </p:cNvSpPr>
+            <p:nvPr/>
+          </p:nvSpPr>
+          <p:spPr bwMode="auto">
+            <a:xfrm>
+              <a:off x="1205012" y="2887483"/>
+              <a:ext cx="634186" cy="369473"/>
+            </a:xfrm>
+            <a:prstGeom prst="rect">
+              <a:avLst/>
+            </a:prstGeom>
+            <a:noFill/>
+            <a:ln>
+              <a:noFill/>
+            </a:ln>
+            <a:extLst>
+              <a:ext uri="{91240B29-F687-4F45-9708-019B960494DF}">
+                <a14:hiddenLine xmlns:a14="http://schemas.microsoft.com/office/drawing/2010/main" w="9525">
+                  <a:solidFill>
+                    <a:srgbClr val="000000"/>
+                  </a:solidFill>
+                  <a:miter lim="800000"/>
+                  <a:headEnd/>
+                  <a:tailEnd/>
+                </a14:hiddenLine>
+              </a:ext>
+            </a:extLst>
+          </p:spPr>
+          <p:txBody>
+            <a:bodyPr wrap="none">
+              <a:spAutoFit/>
+            </a:bodyPr>
+            <a:lstStyle>
+              <a:lvl1pPr>
+                <a:spcBef>
+                  <a:spcPct val="20000"/>
+                </a:spcBef>
+                <a:buFont typeface="Arial" panose="020B0604020202020204" pitchFamily="34" charset="0"/>
+                <a:buChar char="•"/>
+                <a:defRPr sz="3200">
+                  <a:solidFill>
+                    <a:schemeClr val="tx1"/>
+                  </a:solidFill>
+                  <a:latin typeface="Calibri" panose="020F0502020204030204" pitchFamily="34" charset="0"/>
+                  <a:ea typeface="ＭＳ Ｐゴシック" panose="020B0600070205080204" pitchFamily="34" charset="-128"/>
+                </a:defRPr>
+              </a:lvl1pPr>
+              <a:lvl2pPr marL="742950" indent="-285750">
+                <a:spcBef>
+                  <a:spcPct val="20000"/>
+                </a:spcBef>
+                <a:buFont typeface="Arial" panose="020B0604020202020204" pitchFamily="34" charset="0"/>
+                <a:buChar char="–"/>
+                <a:defRPr sz="2800">
+                  <a:solidFill>
+                    <a:schemeClr val="tx1"/>
+                  </a:solidFill>
+                  <a:latin typeface="Calibri" panose="020F0502020204030204" pitchFamily="34" charset="0"/>
+                  <a:ea typeface="ＭＳ Ｐゴシック" panose="020B0600070205080204" pitchFamily="34" charset="-128"/>
+                </a:defRPr>
+              </a:lvl2pPr>
+              <a:lvl3pPr marL="1143000" indent="-228600">
+                <a:spcBef>
+                  <a:spcPct val="20000"/>
+                </a:spcBef>
+                <a:buFont typeface="Arial" panose="020B0604020202020204" pitchFamily="34" charset="0"/>
+                <a:buChar char="•"/>
+                <a:defRPr sz="2400">
+                  <a:solidFill>
+                    <a:schemeClr val="tx1"/>
+                  </a:solidFill>
+                  <a:latin typeface="Calibri" panose="020F0502020204030204" pitchFamily="34" charset="0"/>
+                  <a:ea typeface="ＭＳ Ｐゴシック" panose="020B0600070205080204" pitchFamily="34" charset="-128"/>
+                </a:defRPr>
+              </a:lvl3pPr>
+              <a:lvl4pPr marL="1600200" indent="-228600">
+                <a:spcBef>
+                  <a:spcPct val="20000"/>
+                </a:spcBef>
+                <a:buFont typeface="Arial" panose="020B0604020202020204" pitchFamily="34" charset="0"/>
+                <a:buChar char="–"/>
+                <a:defRPr sz="2000">
+                  <a:solidFill>
+                    <a:schemeClr val="tx1"/>
+                  </a:solidFill>
+                  <a:latin typeface="Calibri" panose="020F0502020204030204" pitchFamily="34" charset="0"/>
+                  <a:ea typeface="ＭＳ Ｐゴシック" panose="020B0600070205080204" pitchFamily="34" charset="-128"/>
+                </a:defRPr>
+              </a:lvl4pPr>
+              <a:lvl5pPr marL="2057400" indent="-228600">
+                <a:spcBef>
+                  <a:spcPct val="20000"/>
+                </a:spcBef>
+                <a:buFont typeface="Arial" panose="020B0604020202020204" pitchFamily="34" charset="0"/>
+                <a:buChar char="»"/>
+                <a:defRPr sz="2000">
+                  <a:solidFill>
+                    <a:schemeClr val="tx1"/>
+                  </a:solidFill>
+                  <a:latin typeface="Calibri" panose="020F0502020204030204" pitchFamily="34" charset="0"/>
+                  <a:ea typeface="ＭＳ Ｐゴシック" panose="020B0600070205080204" pitchFamily="34" charset="-128"/>
+                </a:defRPr>
+              </a:lvl5pPr>
+              <a:lvl6pPr marL="2514600" indent="-228600" defTabSz="457200" eaLnBrk="0" fontAlgn="base" hangingPunct="0">
+                <a:spcBef>
+                  <a:spcPct val="20000"/>
+                </a:spcBef>
+                <a:spcAft>
+                  <a:spcPct val="0"/>
+                </a:spcAft>
+                <a:buFont typeface="Arial" panose="020B0604020202020204" pitchFamily="34" charset="0"/>
+                <a:buChar char="»"/>
+                <a:defRPr sz="2000">
+                  <a:solidFill>
+                    <a:schemeClr val="tx1"/>
+                  </a:solidFill>
+                  <a:latin typeface="Calibri" panose="020F0502020204030204" pitchFamily="34" charset="0"/>
+                  <a:ea typeface="ＭＳ Ｐゴシック" panose="020B0600070205080204" pitchFamily="34" charset="-128"/>
+                </a:defRPr>
+              </a:lvl6pPr>
+              <a:lvl7pPr marL="2971800" indent="-228600" defTabSz="457200" eaLnBrk="0" fontAlgn="base" hangingPunct="0">
+                <a:spcBef>
+                  <a:spcPct val="20000"/>
+                </a:spcBef>
+                <a:spcAft>
+                  <a:spcPct val="0"/>
+                </a:spcAft>
+                <a:buFont typeface="Arial" panose="020B0604020202020204" pitchFamily="34" charset="0"/>
+                <a:buChar char="»"/>
+                <a:defRPr sz="2000">
+                  <a:solidFill>
+                    <a:schemeClr val="tx1"/>
+                  </a:solidFill>
+                  <a:latin typeface="Calibri" panose="020F0502020204030204" pitchFamily="34" charset="0"/>
+                  <a:ea typeface="ＭＳ Ｐゴシック" panose="020B0600070205080204" pitchFamily="34" charset="-128"/>
+                </a:defRPr>
+              </a:lvl7pPr>
+              <a:lvl8pPr marL="3429000" indent="-228600" defTabSz="457200" eaLnBrk="0" fontAlgn="base" hangingPunct="0">
+                <a:spcBef>
+                  <a:spcPct val="20000"/>
+                </a:spcBef>
+                <a:spcAft>
+                  <a:spcPct val="0"/>
+                </a:spcAft>
+                <a:buFont typeface="Arial" panose="020B0604020202020204" pitchFamily="34" charset="0"/>
+                <a:buChar char="»"/>
+                <a:defRPr sz="2000">
+                  <a:solidFill>
+                    <a:schemeClr val="tx1"/>
+                  </a:solidFill>
+                  <a:latin typeface="Calibri" panose="020F0502020204030204" pitchFamily="34" charset="0"/>
+                  <a:ea typeface="ＭＳ Ｐゴシック" panose="020B0600070205080204" pitchFamily="34" charset="-128"/>
+                </a:defRPr>
+              </a:lvl8pPr>
+              <a:lvl9pPr marL="3886200" indent="-228600" defTabSz="457200" eaLnBrk="0" fontAlgn="base" hangingPunct="0">
+                <a:spcBef>
+                  <a:spcPct val="20000"/>
+                </a:spcBef>
+                <a:spcAft>
+                  <a:spcPct val="0"/>
+                </a:spcAft>
+                <a:buFont typeface="Arial" panose="020B0604020202020204" pitchFamily="34" charset="0"/>
+                <a:buChar char="»"/>
+                <a:defRPr sz="2000">
+                  <a:solidFill>
+                    <a:schemeClr val="tx1"/>
+                  </a:solidFill>
+                  <a:latin typeface="Calibri" panose="020F0502020204030204" pitchFamily="34" charset="0"/>
+                  <a:ea typeface="ＭＳ Ｐゴシック" panose="020B0600070205080204" pitchFamily="34" charset="-128"/>
+                </a:defRPr>
+              </a:lvl9pPr>
+            </a:lstStyle>
+            <a:p>
+              <a:pPr marL="0" marR="0" lvl="0" indent="0" algn="ctr" defTabSz="457200" rtl="0" eaLnBrk="0" fontAlgn="base" latinLnBrk="0" hangingPunct="0">
+                <a:lnSpc>
+                  <a:spcPct val="100000"/>
+                </a:lnSpc>
+                <a:spcBef>
+                  <a:spcPct val="0"/>
+                </a:spcBef>
+                <a:spcAft>
+                  <a:spcPct val="0"/>
+                </a:spcAft>
+                <a:buClrTx/>
+                <a:buSzTx/>
+                <a:buFontTx/>
+                <a:buNone/>
+                <a:tabLst/>
+                <a:defRPr/>
+              </a:pPr>
+              <a:r>
+                <a:rPr kumimoji="0" lang="en-US" altLang="en-US" sz="1800" b="0" i="0" u="none" strike="noStrike" kern="1200" cap="none" spc="0" normalizeH="0" noProof="0">
+                  <a:ln>
+                    <a:noFill/>
+                  </a:ln>
+                  <a:effectLst/>
+                  <a:uLnTx/>
+                  <a:uFillTx/>
+                  <a:latin typeface="Arial" panose="020B0604020202020204" pitchFamily="34" charset="0"/>
+                  <a:ea typeface="ＭＳ Ｐゴシック" panose="020B0600070205080204" pitchFamily="34" charset="-128"/>
+                  <a:cs typeface="+mn-cs"/>
+                </a:rPr>
+                <a:t>user</a:t>
+              </a:r>
+              <a:endParaRPr kumimoji="0" lang="en-US" altLang="en-US" sz="1800" b="0" i="0" u="none" strike="noStrike" kern="1200" cap="none" spc="0" normalizeH="0" noProof="0" dirty="0">
+                <a:ln>
+                  <a:noFill/>
+                </a:ln>
+                <a:effectLst/>
+                <a:uLnTx/>
+                <a:uFillTx/>
+                <a:latin typeface="Arial" panose="020B0604020202020204" pitchFamily="34" charset="0"/>
+                <a:ea typeface="ＭＳ Ｐゴシック" panose="020B0600070205080204" pitchFamily="34" charset="-128"/>
+                <a:cs typeface="+mn-cs"/>
+              </a:endParaRPr>
+            </a:p>
+          </p:txBody>
+        </p:sp>
+      </p:grpSp>
+      <p:sp>
+        <p:nvSpPr>
+          <p:cNvPr id="29" name="Arc 28">
+            <a:extLst>
+              <a:ext uri="{FF2B5EF4-FFF2-40B4-BE49-F238E27FC236}">
+                <a16:creationId xmlns:a16="http://schemas.microsoft.com/office/drawing/2014/main" id="{09F6949D-3E2D-483C-8497-98E73FA0C55D}"/>
+              </a:ext>
+            </a:extLst>
+          </p:cNvPr>
+          <p:cNvSpPr/>
+          <p:nvPr/>
+        </p:nvSpPr>
+        <p:spPr>
+          <a:xfrm>
+            <a:off x="5310126" y="3371996"/>
+            <a:ext cx="914400" cy="914400"/>
+          </a:xfrm>
+          <a:prstGeom prst="arc">
+            <a:avLst>
+              <a:gd name="adj1" fmla="val 15774383"/>
+              <a:gd name="adj2" fmla="val 701900"/>
+            </a:avLst>
+          </a:prstGeom>
+          <a:ln w="12700">
+            <a:solidFill>
+              <a:schemeClr val="tx1"/>
+            </a:solidFill>
+            <a:tailEnd type="triangle" w="lg" len="lg"/>
+          </a:ln>
+        </p:spPr>
+        <p:style>
+          <a:lnRef idx="1">
+            <a:schemeClr val="accent1"/>
+          </a:lnRef>
+          <a:fillRef idx="0">
+            <a:schemeClr val="accent1"/>
+          </a:fillRef>
+          <a:effectRef idx="0">
+            <a:schemeClr val="accent1"/>
+          </a:effectRef>
+          <a:fontRef idx="minor">
+            <a:schemeClr val="tx1"/>
+          </a:fontRef>
+        </p:style>
+        <p:txBody>
+          <a:bodyPr rtlCol="0" anchor="ctr"/>
+          <a:lstStyle/>
+          <a:p>
+            <a:pPr algn="ctr"/>
+            <a:endParaRPr lang="en-US"/>
+          </a:p>
+        </p:txBody>
+      </p:sp>
+      <p:sp>
+        <p:nvSpPr>
+          <p:cNvPr id="30" name="Arc 29">
+            <a:extLst>
+              <a:ext uri="{FF2B5EF4-FFF2-40B4-BE49-F238E27FC236}">
+                <a16:creationId xmlns:a16="http://schemas.microsoft.com/office/drawing/2014/main" id="{19886EFD-FF6A-44AA-9433-66982E3447AC}"/>
+              </a:ext>
+            </a:extLst>
+          </p:cNvPr>
+          <p:cNvSpPr/>
+          <p:nvPr/>
+        </p:nvSpPr>
+        <p:spPr>
+          <a:xfrm>
+            <a:off x="4140962" y="3108959"/>
+            <a:ext cx="914400" cy="914400"/>
+          </a:xfrm>
+          <a:prstGeom prst="arc">
+            <a:avLst>
+              <a:gd name="adj1" fmla="val 1278672"/>
+              <a:gd name="adj2" fmla="val 9408329"/>
+            </a:avLst>
+          </a:prstGeom>
+          <a:ln w="12700">
+            <a:solidFill>
+              <a:schemeClr val="tx1"/>
+            </a:solidFill>
+            <a:tailEnd type="triangle" w="lg" len="lg"/>
+          </a:ln>
+        </p:spPr>
+        <p:style>
+          <a:lnRef idx="1">
+            <a:schemeClr val="accent1"/>
+          </a:lnRef>
+          <a:fillRef idx="0">
+            <a:schemeClr val="accent1"/>
+          </a:fillRef>
+          <a:effectRef idx="0">
+            <a:schemeClr val="accent1"/>
+          </a:effectRef>
+          <a:fontRef idx="minor">
+            <a:schemeClr val="tx1"/>
+          </a:fontRef>
+        </p:style>
+        <p:txBody>
+          <a:bodyPr rtlCol="0" anchor="ctr"/>
+          <a:lstStyle/>
+          <a:p>
+            <a:pPr algn="ctr"/>
+            <a:endParaRPr lang="en-US"/>
+          </a:p>
+        </p:txBody>
+      </p:sp>
+      <p:cxnSp>
+        <p:nvCxnSpPr>
+          <p:cNvPr id="38" name="Straight Arrow Connector 37">
+            <a:extLst>
+              <a:ext uri="{FF2B5EF4-FFF2-40B4-BE49-F238E27FC236}">
+                <a16:creationId xmlns:a16="http://schemas.microsoft.com/office/drawing/2014/main" id="{0C3C4993-3935-4FAD-8033-38EF929B48D7}"/>
+              </a:ext>
+            </a:extLst>
+          </p:cNvPr>
+          <p:cNvCxnSpPr>
+            <a:cxnSpLocks/>
+          </p:cNvCxnSpPr>
+          <p:nvPr/>
+        </p:nvCxnSpPr>
+        <p:spPr>
+          <a:xfrm>
+            <a:off x="5363807" y="2060807"/>
+            <a:ext cx="221316" cy="30285"/>
+          </a:xfrm>
+          <a:prstGeom prst="straightConnector1">
+            <a:avLst/>
+          </a:prstGeom>
+          <a:ln w="38100">
+            <a:solidFill>
+              <a:schemeClr val="tx1"/>
+            </a:solidFill>
+            <a:tailEnd type="triangle" w="lg" len="lg"/>
+          </a:ln>
+        </p:spPr>
+        <p:style>
+          <a:lnRef idx="1">
+            <a:schemeClr val="accent1"/>
+          </a:lnRef>
+          <a:fillRef idx="0">
+            <a:schemeClr val="accent1"/>
+          </a:fillRef>
+          <a:effectRef idx="0">
+            <a:schemeClr val="accent1"/>
+          </a:effectRef>
+          <a:fontRef idx="minor">
+            <a:schemeClr val="tx1"/>
+          </a:fontRef>
+        </p:style>
+      </p:cxnSp>
+      <p:sp>
+        <p:nvSpPr>
+          <p:cNvPr id="47" name="Arc 46">
+            <a:extLst>
+              <a:ext uri="{FF2B5EF4-FFF2-40B4-BE49-F238E27FC236}">
+                <a16:creationId xmlns:a16="http://schemas.microsoft.com/office/drawing/2014/main" id="{71FDB2C5-BC68-4066-819F-0A20385C24B8}"/>
+              </a:ext>
+            </a:extLst>
+          </p:cNvPr>
+          <p:cNvSpPr/>
+          <p:nvPr/>
+        </p:nvSpPr>
+        <p:spPr>
+          <a:xfrm>
+            <a:off x="2735362" y="3108959"/>
+            <a:ext cx="914400" cy="914400"/>
+          </a:xfrm>
+          <a:prstGeom prst="arc">
+            <a:avLst>
+              <a:gd name="adj1" fmla="val 1278672"/>
+              <a:gd name="adj2" fmla="val 8968526"/>
+            </a:avLst>
+          </a:prstGeom>
+          <a:ln w="12700">
+            <a:solidFill>
+              <a:schemeClr val="tx1"/>
+            </a:solidFill>
+            <a:tailEnd type="triangle" w="lg" len="lg"/>
+          </a:ln>
+        </p:spPr>
+        <p:style>
+          <a:lnRef idx="1">
+            <a:schemeClr val="accent1"/>
+          </a:lnRef>
+          <a:fillRef idx="0">
+            <a:schemeClr val="accent1"/>
+          </a:fillRef>
+          <a:effectRef idx="0">
+            <a:schemeClr val="accent1"/>
+          </a:effectRef>
+          <a:fontRef idx="minor">
+            <a:schemeClr val="tx1"/>
+          </a:fontRef>
+        </p:style>
+        <p:txBody>
+          <a:bodyPr rtlCol="0" anchor="ctr"/>
+          <a:lstStyle/>
+          <a:p>
+            <a:pPr algn="ctr"/>
+            <a:endParaRPr lang="en-US"/>
+          </a:p>
+        </p:txBody>
+      </p:sp>
+      <p:sp>
+        <p:nvSpPr>
+          <p:cNvPr id="27" name="Cylinder 26">
+            <a:extLst>
+              <a:ext uri="{FF2B5EF4-FFF2-40B4-BE49-F238E27FC236}">
+                <a16:creationId xmlns:a16="http://schemas.microsoft.com/office/drawing/2014/main" id="{7042DD10-FCE8-4749-9617-DD349939AD3A}"/>
+              </a:ext>
+            </a:extLst>
+          </p:cNvPr>
+          <p:cNvSpPr/>
+          <p:nvPr/>
+        </p:nvSpPr>
+        <p:spPr>
+          <a:xfrm>
+            <a:off x="4800598" y="3108959"/>
+            <a:ext cx="914400" cy="640080"/>
+          </a:xfrm>
+          <a:prstGeom prst="can">
+            <a:avLst/>
+          </a:prstGeom>
+          <a:solidFill>
+            <a:schemeClr val="accent3"/>
+          </a:solidFill>
+          <a:ln>
+            <a:solidFill>
+              <a:schemeClr val="tx1"/>
+            </a:solidFill>
+          </a:ln>
+        </p:spPr>
+        <p:style>
+          <a:lnRef idx="2">
+            <a:schemeClr val="accent1">
+              <a:shade val="50000"/>
+            </a:schemeClr>
+          </a:lnRef>
+          <a:fillRef idx="1">
+            <a:schemeClr val="accent1"/>
+          </a:fillRef>
+          <a:effectRef idx="0">
+            <a:schemeClr val="accent1"/>
+          </a:effectRef>
+          <a:fontRef idx="minor">
+            <a:schemeClr val="lt1"/>
+          </a:fontRef>
+        </p:style>
+        <p:txBody>
+          <a:bodyPr rtlCol="0" anchor="ctr"/>
+          <a:lstStyle/>
+          <a:p>
+            <a:pPr algn="ctr"/>
+            <a:r>
+              <a:rPr lang="en-US">
+                <a:solidFill>
+                  <a:schemeClr val="tx1"/>
+                </a:solidFill>
+                <a:latin typeface="Arial" panose="020B0604020202020204" pitchFamily="34" charset="0"/>
+              </a:rPr>
+              <a:t>data</a:t>
+            </a:r>
+          </a:p>
+        </p:txBody>
+      </p:sp>
+      <p:sp>
+        <p:nvSpPr>
+          <p:cNvPr id="48" name="TextBox 47">
+            <a:extLst>
+              <a:ext uri="{FF2B5EF4-FFF2-40B4-BE49-F238E27FC236}">
+                <a16:creationId xmlns:a16="http://schemas.microsoft.com/office/drawing/2014/main" id="{2E26934D-EFA2-475D-846D-5433B4461D6A}"/>
+              </a:ext>
+            </a:extLst>
+          </p:cNvPr>
+          <p:cNvSpPr txBox="1"/>
+          <p:nvPr/>
+        </p:nvSpPr>
+        <p:spPr>
+          <a:xfrm>
+            <a:off x="2054863" y="2325185"/>
+            <a:ext cx="556563" cy="369332"/>
+          </a:xfrm>
+          <a:prstGeom prst="rect">
+            <a:avLst/>
+          </a:prstGeom>
+          <a:noFill/>
+        </p:spPr>
+        <p:txBody>
+          <a:bodyPr wrap="none" rtlCol="0">
+            <a:spAutoFit/>
+          </a:bodyPr>
+          <a:lstStyle/>
+          <a:p>
+            <a:r>
+              <a:rPr lang="en-US" i="1">
+                <a:latin typeface="Arial" panose="020B0604020202020204" pitchFamily="34" charset="0"/>
+              </a:rPr>
+              <a:t>edit</a:t>
+            </a:r>
+          </a:p>
+        </p:txBody>
+      </p:sp>
+      <p:sp>
+        <p:nvSpPr>
+          <p:cNvPr id="49" name="TextBox 48">
+            <a:extLst>
+              <a:ext uri="{FF2B5EF4-FFF2-40B4-BE49-F238E27FC236}">
+                <a16:creationId xmlns:a16="http://schemas.microsoft.com/office/drawing/2014/main" id="{8FC528C1-5E62-4C23-B10C-FAB42B8C56D0}"/>
+              </a:ext>
+            </a:extLst>
+          </p:cNvPr>
+          <p:cNvSpPr txBox="1"/>
+          <p:nvPr/>
+        </p:nvSpPr>
+        <p:spPr>
+          <a:xfrm>
+            <a:off x="4656664" y="1662142"/>
+            <a:ext cx="928459" cy="369332"/>
+          </a:xfrm>
+          <a:prstGeom prst="rect">
+            <a:avLst/>
+          </a:prstGeom>
+          <a:noFill/>
+        </p:spPr>
+        <p:txBody>
+          <a:bodyPr wrap="none" rtlCol="0">
+            <a:spAutoFit/>
+          </a:bodyPr>
+          <a:lstStyle/>
+          <a:p>
+            <a:r>
+              <a:rPr lang="en-US" i="1">
+                <a:latin typeface="Arial" panose="020B0604020202020204" pitchFamily="34" charset="0"/>
+              </a:rPr>
+              <a:t>sample</a:t>
+            </a:r>
+          </a:p>
+        </p:txBody>
+      </p:sp>
+      <p:sp>
+        <p:nvSpPr>
+          <p:cNvPr id="51" name="TextBox 50">
+            <a:extLst>
+              <a:ext uri="{FF2B5EF4-FFF2-40B4-BE49-F238E27FC236}">
+                <a16:creationId xmlns:a16="http://schemas.microsoft.com/office/drawing/2014/main" id="{319B665E-B995-4406-8ADD-F5052C17F7DB}"/>
+              </a:ext>
+            </a:extLst>
+          </p:cNvPr>
+          <p:cNvSpPr txBox="1"/>
+          <p:nvPr/>
+        </p:nvSpPr>
+        <p:spPr>
+          <a:xfrm>
+            <a:off x="2683188" y="4013333"/>
+            <a:ext cx="915635" cy="369332"/>
+          </a:xfrm>
+          <a:prstGeom prst="rect">
+            <a:avLst/>
+          </a:prstGeom>
+          <a:noFill/>
+        </p:spPr>
+        <p:txBody>
+          <a:bodyPr wrap="none" rtlCol="0">
+            <a:spAutoFit/>
+          </a:bodyPr>
+          <a:lstStyle/>
+          <a:p>
+            <a:r>
+              <a:rPr lang="en-US" i="1">
+                <a:latin typeface="Arial" panose="020B0604020202020204" pitchFamily="34" charset="0"/>
+              </a:rPr>
+              <a:t>inspect</a:t>
+            </a:r>
+          </a:p>
+        </p:txBody>
+      </p:sp>
+      <p:sp>
+        <p:nvSpPr>
+          <p:cNvPr id="52" name="TextBox 51">
+            <a:extLst>
+              <a:ext uri="{FF2B5EF4-FFF2-40B4-BE49-F238E27FC236}">
+                <a16:creationId xmlns:a16="http://schemas.microsoft.com/office/drawing/2014/main" id="{4E320745-EE30-4269-BE03-11300B278EE4}"/>
+              </a:ext>
+            </a:extLst>
+          </p:cNvPr>
+          <p:cNvSpPr txBox="1"/>
+          <p:nvPr/>
+        </p:nvSpPr>
+        <p:spPr>
+          <a:xfrm>
+            <a:off x="4205277" y="4011253"/>
+            <a:ext cx="1056700" cy="369332"/>
+          </a:xfrm>
+          <a:prstGeom prst="rect">
+            <a:avLst/>
+          </a:prstGeom>
+          <a:noFill/>
+        </p:spPr>
+        <p:txBody>
+          <a:bodyPr wrap="none" rtlCol="0">
+            <a:spAutoFit/>
+          </a:bodyPr>
+          <a:lstStyle/>
+          <a:p>
+            <a:r>
+              <a:rPr lang="en-US" i="1">
+                <a:latin typeface="Arial" panose="020B0604020202020204" pitchFamily="34" charset="0"/>
+              </a:rPr>
+              <a:t>evaluate</a:t>
+            </a:r>
+          </a:p>
+        </p:txBody>
+      </p:sp>
+      <p:sp>
+        <p:nvSpPr>
+          <p:cNvPr id="59" name="Arc 58">
+            <a:extLst>
+              <a:ext uri="{FF2B5EF4-FFF2-40B4-BE49-F238E27FC236}">
+                <a16:creationId xmlns:a16="http://schemas.microsoft.com/office/drawing/2014/main" id="{176FE4E0-4287-4A82-80AB-702DF7543C37}"/>
+              </a:ext>
+            </a:extLst>
+          </p:cNvPr>
+          <p:cNvSpPr/>
+          <p:nvPr/>
+        </p:nvSpPr>
+        <p:spPr>
+          <a:xfrm>
+            <a:off x="3886200" y="2057400"/>
+            <a:ext cx="2743200" cy="2743200"/>
+          </a:xfrm>
+          <a:prstGeom prst="arc">
+            <a:avLst>
+              <a:gd name="adj1" fmla="val 3117121"/>
+              <a:gd name="adj2" fmla="val 18288764"/>
+            </a:avLst>
+          </a:prstGeom>
+          <a:ln w="38100">
+            <a:solidFill>
+              <a:schemeClr val="tx1"/>
+            </a:solidFill>
+            <a:tailEnd type="triangle" w="lg" len="lg"/>
+          </a:ln>
+        </p:spPr>
+        <p:style>
+          <a:lnRef idx="1">
+            <a:schemeClr val="accent1"/>
+          </a:lnRef>
+          <a:fillRef idx="0">
+            <a:schemeClr val="accent1"/>
+          </a:fillRef>
+          <a:effectRef idx="0">
+            <a:schemeClr val="accent1"/>
+          </a:effectRef>
+          <a:fontRef idx="minor">
+            <a:schemeClr val="tx1"/>
+          </a:fontRef>
+        </p:style>
+        <p:txBody>
+          <a:bodyPr rtlCol="0" anchor="ctr"/>
+          <a:lstStyle/>
+          <a:p>
+            <a:pPr algn="ctr"/>
+            <a:endParaRPr lang="en-US"/>
+          </a:p>
+        </p:txBody>
+      </p:sp>
+      <p:sp>
+        <p:nvSpPr>
+          <p:cNvPr id="12" name="Rectangle 11">
+            <a:extLst>
+              <a:ext uri="{FF2B5EF4-FFF2-40B4-BE49-F238E27FC236}">
+                <a16:creationId xmlns:a16="http://schemas.microsoft.com/office/drawing/2014/main" id="{4FEC00F9-78CD-4428-AE10-4D9168E4BD01}"/>
+              </a:ext>
+            </a:extLst>
+          </p:cNvPr>
+          <p:cNvSpPr/>
+          <p:nvPr/>
+        </p:nvSpPr>
+        <p:spPr>
+          <a:xfrm>
+            <a:off x="3337559" y="3108959"/>
+            <a:ext cx="1097280" cy="640080"/>
+          </a:xfrm>
+          <a:prstGeom prst="rect">
+            <a:avLst/>
+          </a:prstGeom>
+          <a:solidFill>
+            <a:schemeClr val="bg1"/>
+          </a:solidFill>
+          <a:ln>
+            <a:solidFill>
+              <a:schemeClr val="tx1"/>
+            </a:solidFill>
+          </a:ln>
+        </p:spPr>
+        <p:style>
+          <a:lnRef idx="2">
+            <a:schemeClr val="accent1">
+              <a:shade val="50000"/>
+            </a:schemeClr>
+          </a:lnRef>
+          <a:fillRef idx="1">
+            <a:schemeClr val="accent1"/>
+          </a:fillRef>
+          <a:effectRef idx="0">
+            <a:schemeClr val="accent1"/>
+          </a:effectRef>
+          <a:fontRef idx="minor">
+            <a:schemeClr val="lt1"/>
+          </a:fontRef>
+        </p:style>
+        <p:txBody>
+          <a:bodyPr rtlCol="0" anchor="ctr"/>
+          <a:lstStyle/>
+          <a:p>
+            <a:pPr algn="ctr"/>
+            <a:r>
+              <a:rPr lang="en-US">
+                <a:solidFill>
+                  <a:schemeClr val="tx1"/>
+                </a:solidFill>
+                <a:latin typeface="Arial" panose="020B0604020202020204" pitchFamily="34" charset="0"/>
+              </a:rPr>
+              <a:t>metrics</a:t>
+            </a:r>
+          </a:p>
+        </p:txBody>
+      </p:sp>
+      <p:sp>
+        <p:nvSpPr>
+          <p:cNvPr id="10" name="Rectangle 9">
+            <a:extLst>
+              <a:ext uri="{FF2B5EF4-FFF2-40B4-BE49-F238E27FC236}">
+                <a16:creationId xmlns:a16="http://schemas.microsoft.com/office/drawing/2014/main" id="{F7DDACE4-AB04-4E22-B379-97CCDC18FA46}"/>
+              </a:ext>
+            </a:extLst>
+          </p:cNvPr>
+          <p:cNvSpPr/>
+          <p:nvPr/>
+        </p:nvSpPr>
+        <p:spPr>
+          <a:xfrm>
+            <a:off x="5767326" y="3909353"/>
+            <a:ext cx="1097280" cy="640080"/>
+          </a:xfrm>
+          <a:prstGeom prst="rect">
+            <a:avLst/>
+          </a:prstGeom>
+          <a:solidFill>
+            <a:schemeClr val="bg1"/>
+          </a:solidFill>
+          <a:ln>
+            <a:solidFill>
+              <a:schemeClr val="tx1"/>
+            </a:solidFill>
+          </a:ln>
+        </p:spPr>
+        <p:style>
+          <a:lnRef idx="2">
+            <a:schemeClr val="accent1">
+              <a:shade val="50000"/>
+            </a:schemeClr>
+          </a:lnRef>
+          <a:fillRef idx="1">
+            <a:schemeClr val="accent1"/>
+          </a:fillRef>
+          <a:effectRef idx="0">
+            <a:schemeClr val="accent1"/>
+          </a:effectRef>
+          <a:fontRef idx="minor">
+            <a:schemeClr val="lt1"/>
+          </a:fontRef>
+        </p:style>
+        <p:txBody>
+          <a:bodyPr rtlCol="0" anchor="ctr"/>
+          <a:lstStyle/>
+          <a:p>
+            <a:pPr algn="ctr"/>
+            <a:r>
+              <a:rPr lang="en-US">
+                <a:solidFill>
+                  <a:schemeClr val="tx1"/>
+                </a:solidFill>
+                <a:latin typeface="Arial" panose="020B0604020202020204" pitchFamily="34" charset="0"/>
+              </a:rPr>
+              <a:t>trained pipeline</a:t>
+            </a:r>
+          </a:p>
+        </p:txBody>
+      </p:sp>
+      <p:sp>
+        <p:nvSpPr>
+          <p:cNvPr id="60" name="TextBox 59">
+            <a:extLst>
+              <a:ext uri="{FF2B5EF4-FFF2-40B4-BE49-F238E27FC236}">
+                <a16:creationId xmlns:a16="http://schemas.microsoft.com/office/drawing/2014/main" id="{C48C040D-2A80-415C-8F48-919B246F5B44}"/>
+              </a:ext>
+            </a:extLst>
+          </p:cNvPr>
+          <p:cNvSpPr txBox="1"/>
+          <p:nvPr/>
+        </p:nvSpPr>
+        <p:spPr>
+          <a:xfrm>
+            <a:off x="6209909" y="3381493"/>
+            <a:ext cx="364202" cy="369332"/>
+          </a:xfrm>
+          <a:prstGeom prst="rect">
+            <a:avLst/>
+          </a:prstGeom>
+          <a:noFill/>
+        </p:spPr>
+        <p:txBody>
+          <a:bodyPr wrap="none" rtlCol="0">
+            <a:spAutoFit/>
+          </a:bodyPr>
+          <a:lstStyle/>
+          <a:p>
+            <a:r>
+              <a:rPr lang="en-US" i="1">
+                <a:latin typeface="Arial" panose="020B0604020202020204" pitchFamily="34" charset="0"/>
+              </a:rPr>
+              <a:t>fit</a:t>
+            </a:r>
+          </a:p>
+        </p:txBody>
+      </p:sp>
+      <p:cxnSp>
+        <p:nvCxnSpPr>
+          <p:cNvPr id="61" name="Straight Arrow Connector 60">
+            <a:extLst>
+              <a:ext uri="{FF2B5EF4-FFF2-40B4-BE49-F238E27FC236}">
+                <a16:creationId xmlns:a16="http://schemas.microsoft.com/office/drawing/2014/main" id="{7354EEDA-8032-4DC5-A7E9-06AB0C916F0C}"/>
+              </a:ext>
+            </a:extLst>
+          </p:cNvPr>
+          <p:cNvCxnSpPr>
+            <a:cxnSpLocks/>
+          </p:cNvCxnSpPr>
+          <p:nvPr/>
+        </p:nvCxnSpPr>
+        <p:spPr>
+          <a:xfrm flipH="1">
+            <a:off x="6573606" y="3703864"/>
+            <a:ext cx="36744" cy="205489"/>
+          </a:xfrm>
+          <a:prstGeom prst="straightConnector1">
+            <a:avLst/>
+          </a:prstGeom>
+          <a:ln w="38100">
+            <a:solidFill>
+              <a:schemeClr val="tx1"/>
+            </a:solidFill>
+            <a:tailEnd type="triangle" w="lg" len="lg"/>
+          </a:ln>
+        </p:spPr>
+        <p:style>
+          <a:lnRef idx="1">
+            <a:schemeClr val="accent1"/>
+          </a:lnRef>
+          <a:fillRef idx="0">
+            <a:schemeClr val="accent1"/>
+          </a:fillRef>
+          <a:effectRef idx="0">
+            <a:schemeClr val="accent1"/>
+          </a:effectRef>
+          <a:fontRef idx="minor">
+            <a:schemeClr val="tx1"/>
+          </a:fontRef>
+        </p:style>
+      </p:cxnSp>
+      <p:cxnSp>
+        <p:nvCxnSpPr>
+          <p:cNvPr id="62" name="Straight Arrow Connector 61">
+            <a:extLst>
+              <a:ext uri="{FF2B5EF4-FFF2-40B4-BE49-F238E27FC236}">
+                <a16:creationId xmlns:a16="http://schemas.microsoft.com/office/drawing/2014/main" id="{ABBFC1DB-EE0E-4F95-8542-450C7C16BB62}"/>
+              </a:ext>
+            </a:extLst>
+          </p:cNvPr>
+          <p:cNvCxnSpPr>
+            <a:cxnSpLocks/>
+          </p:cNvCxnSpPr>
+          <p:nvPr/>
+        </p:nvCxnSpPr>
+        <p:spPr>
+          <a:xfrm flipH="1" flipV="1">
+            <a:off x="3918057" y="3749039"/>
+            <a:ext cx="76702" cy="209279"/>
+          </a:xfrm>
+          <a:prstGeom prst="straightConnector1">
+            <a:avLst/>
+          </a:prstGeom>
+          <a:ln w="38100">
+            <a:solidFill>
+              <a:schemeClr val="tx1"/>
+            </a:solidFill>
+            <a:tailEnd type="triangle" w="lg" len="lg"/>
+          </a:ln>
+        </p:spPr>
+        <p:style>
+          <a:lnRef idx="1">
+            <a:schemeClr val="accent1"/>
+          </a:lnRef>
+          <a:fillRef idx="0">
+            <a:schemeClr val="accent1"/>
+          </a:fillRef>
+          <a:effectRef idx="0">
+            <a:schemeClr val="accent1"/>
+          </a:effectRef>
+          <a:fontRef idx="minor">
+            <a:schemeClr val="tx1"/>
+          </a:fontRef>
+        </p:style>
+      </p:cxnSp>
+      <p:cxnSp>
+        <p:nvCxnSpPr>
+          <p:cNvPr id="28" name="Straight Arrow Connector 27">
+            <a:extLst>
+              <a:ext uri="{FF2B5EF4-FFF2-40B4-BE49-F238E27FC236}">
+                <a16:creationId xmlns:a16="http://schemas.microsoft.com/office/drawing/2014/main" id="{FFEBCD54-74DB-47FA-B972-BA420781349E}"/>
+              </a:ext>
+            </a:extLst>
+          </p:cNvPr>
+          <p:cNvCxnSpPr>
+            <a:cxnSpLocks/>
+          </p:cNvCxnSpPr>
+          <p:nvPr/>
+        </p:nvCxnSpPr>
+        <p:spPr>
+          <a:xfrm flipV="1">
+            <a:off x="2759529" y="2252601"/>
+            <a:ext cx="127907" cy="194436"/>
+          </a:xfrm>
+          <a:prstGeom prst="straightConnector1">
+            <a:avLst/>
+          </a:prstGeom>
+          <a:ln w="38100">
+            <a:solidFill>
+              <a:schemeClr val="tx1"/>
+            </a:solidFill>
+            <a:tailEnd type="triangle" w="lg" len="lg"/>
+          </a:ln>
+        </p:spPr>
+        <p:style>
+          <a:lnRef idx="1">
+            <a:schemeClr val="accent1"/>
+          </a:lnRef>
+          <a:fillRef idx="0">
+            <a:schemeClr val="accent1"/>
+          </a:fillRef>
+          <a:effectRef idx="0">
+            <a:schemeClr val="accent1"/>
+          </a:effectRef>
+          <a:fontRef idx="minor">
+            <a:schemeClr val="tx1"/>
+          </a:fontRef>
+        </p:style>
+      </p:cxnSp>
+      <p:sp>
+        <p:nvSpPr>
+          <p:cNvPr id="34" name="Rectangle 33">
+            <a:extLst>
+              <a:ext uri="{FF2B5EF4-FFF2-40B4-BE49-F238E27FC236}">
+                <a16:creationId xmlns:a16="http://schemas.microsoft.com/office/drawing/2014/main" id="{A4D3F4CD-D161-4813-B928-D7E26594F713}"/>
+              </a:ext>
+            </a:extLst>
+          </p:cNvPr>
+          <p:cNvSpPr/>
+          <p:nvPr/>
+        </p:nvSpPr>
+        <p:spPr>
+          <a:xfrm>
+            <a:off x="4350937" y="1028115"/>
+            <a:ext cx="1097280" cy="640080"/>
+          </a:xfrm>
+          <a:prstGeom prst="rect">
+            <a:avLst/>
+          </a:prstGeom>
+          <a:solidFill>
+            <a:srgbClr val="7EC0EF"/>
+          </a:solidFill>
+          <a:ln>
+            <a:solidFill>
+              <a:schemeClr val="tx1"/>
+            </a:solidFill>
+          </a:ln>
+        </p:spPr>
+        <p:style>
+          <a:lnRef idx="2">
+            <a:schemeClr val="accent1">
+              <a:shade val="50000"/>
+            </a:schemeClr>
+          </a:lnRef>
+          <a:fillRef idx="1">
+            <a:schemeClr val="accent1"/>
+          </a:fillRef>
+          <a:effectRef idx="0">
+            <a:schemeClr val="accent1"/>
+          </a:effectRef>
+          <a:fontRef idx="minor">
+            <a:schemeClr val="lt1"/>
+          </a:fontRef>
+        </p:style>
+        <p:txBody>
+          <a:bodyPr rtlCol="0" anchor="ctr"/>
+          <a:lstStyle/>
+          <a:p>
+            <a:pPr algn="ctr"/>
+            <a:r>
+              <a:rPr lang="en-US" sz="1500">
+                <a:solidFill>
+                  <a:schemeClr val="tx1"/>
+                </a:solidFill>
+                <a:latin typeface="Arial" panose="020B0604020202020204" pitchFamily="34" charset="0"/>
+              </a:rPr>
+              <a:t>optimizer search space</a:t>
+            </a:r>
+          </a:p>
+        </p:txBody>
+      </p:sp>
+      <p:sp>
+        <p:nvSpPr>
+          <p:cNvPr id="35" name="TextBox 34">
+            <a:extLst>
+              <a:ext uri="{FF2B5EF4-FFF2-40B4-BE49-F238E27FC236}">
+                <a16:creationId xmlns:a16="http://schemas.microsoft.com/office/drawing/2014/main" id="{D41FAD4F-8A9E-489D-8399-C44DBAE7BCE1}"/>
+              </a:ext>
+            </a:extLst>
+          </p:cNvPr>
+          <p:cNvSpPr txBox="1"/>
+          <p:nvPr/>
+        </p:nvSpPr>
+        <p:spPr>
+          <a:xfrm>
+            <a:off x="3231555" y="1050831"/>
+            <a:ext cx="941283" cy="369332"/>
+          </a:xfrm>
+          <a:prstGeom prst="rect">
+            <a:avLst/>
+          </a:prstGeom>
+          <a:noFill/>
+        </p:spPr>
+        <p:txBody>
+          <a:bodyPr wrap="none" rtlCol="0">
+            <a:spAutoFit/>
+          </a:bodyPr>
+          <a:lstStyle/>
+          <a:p>
+            <a:r>
+              <a:rPr lang="en-US" i="1">
+                <a:latin typeface="Arial" panose="020B0604020202020204" pitchFamily="34" charset="0"/>
+              </a:rPr>
+              <a:t>encode</a:t>
+            </a:r>
+          </a:p>
+        </p:txBody>
+      </p:sp>
+      <p:cxnSp>
+        <p:nvCxnSpPr>
+          <p:cNvPr id="31" name="Straight Arrow Connector 30">
+            <a:extLst>
+              <a:ext uri="{FF2B5EF4-FFF2-40B4-BE49-F238E27FC236}">
+                <a16:creationId xmlns:a16="http://schemas.microsoft.com/office/drawing/2014/main" id="{5A68D8FE-DEE8-4F36-A793-63C9C3FB353B}"/>
+              </a:ext>
+            </a:extLst>
+          </p:cNvPr>
+          <p:cNvCxnSpPr>
+            <a:cxnSpLocks/>
+          </p:cNvCxnSpPr>
+          <p:nvPr/>
+        </p:nvCxnSpPr>
+        <p:spPr>
+          <a:xfrm flipV="1">
+            <a:off x="4098471" y="1372959"/>
+            <a:ext cx="260157" cy="55790"/>
+          </a:xfrm>
+          <a:prstGeom prst="straightConnector1">
+            <a:avLst/>
+          </a:prstGeom>
+          <a:ln w="38100">
+            <a:solidFill>
+              <a:schemeClr val="tx1"/>
+            </a:solidFill>
+            <a:tailEnd type="triangle" w="lg" len="lg"/>
+          </a:ln>
+        </p:spPr>
+        <p:style>
+          <a:lnRef idx="1">
+            <a:schemeClr val="accent1"/>
+          </a:lnRef>
+          <a:fillRef idx="0">
+            <a:schemeClr val="accent1"/>
+          </a:fillRef>
+          <a:effectRef idx="0">
+            <a:schemeClr val="accent1"/>
+          </a:effectRef>
+          <a:fontRef idx="minor">
+            <a:schemeClr val="tx1"/>
+          </a:fontRef>
+        </p:style>
+      </p:cxnSp>
+      <p:sp>
+        <p:nvSpPr>
+          <p:cNvPr id="33" name="Rectangle 32">
+            <a:extLst>
+              <a:ext uri="{FF2B5EF4-FFF2-40B4-BE49-F238E27FC236}">
+                <a16:creationId xmlns:a16="http://schemas.microsoft.com/office/drawing/2014/main" id="{CBB8444C-623F-4F47-854D-6FC2E80FE39E}"/>
+              </a:ext>
+            </a:extLst>
+          </p:cNvPr>
+          <p:cNvSpPr/>
+          <p:nvPr/>
+        </p:nvSpPr>
+        <p:spPr>
+          <a:xfrm>
+            <a:off x="5585123" y="1791925"/>
+            <a:ext cx="1097280" cy="640080"/>
+          </a:xfrm>
+          <a:prstGeom prst="rect">
+            <a:avLst/>
+          </a:prstGeom>
+          <a:solidFill>
+            <a:srgbClr val="B0E2FF"/>
+          </a:solidFill>
+          <a:ln>
+            <a:solidFill>
+              <a:schemeClr val="tx1"/>
+            </a:solidFill>
+          </a:ln>
+        </p:spPr>
+        <p:style>
+          <a:lnRef idx="2">
+            <a:schemeClr val="accent1">
+              <a:shade val="50000"/>
+            </a:schemeClr>
+          </a:lnRef>
+          <a:fillRef idx="1">
+            <a:schemeClr val="accent1"/>
+          </a:fillRef>
+          <a:effectRef idx="0">
+            <a:schemeClr val="accent1"/>
+          </a:effectRef>
+          <a:fontRef idx="minor">
+            <a:schemeClr val="lt1"/>
+          </a:fontRef>
+        </p:style>
+        <p:txBody>
+          <a:bodyPr rtlCol="0" anchor="ctr"/>
+          <a:lstStyle/>
+          <a:p>
+            <a:pPr algn="ctr"/>
+            <a:r>
+              <a:rPr lang="en-US" sz="1500">
+                <a:solidFill>
+                  <a:schemeClr val="tx1"/>
+                </a:solidFill>
+                <a:latin typeface="Arial" panose="020B0604020202020204" pitchFamily="34" charset="0"/>
+              </a:rPr>
+              <a:t>point in search space</a:t>
+            </a:r>
+          </a:p>
+        </p:txBody>
+      </p:sp>
+      <p:cxnSp>
+        <p:nvCxnSpPr>
+          <p:cNvPr id="36" name="Straight Arrow Connector 35">
+            <a:extLst>
+              <a:ext uri="{FF2B5EF4-FFF2-40B4-BE49-F238E27FC236}">
+                <a16:creationId xmlns:a16="http://schemas.microsoft.com/office/drawing/2014/main" id="{EC55581B-4B99-471A-8782-795A89C60983}"/>
+              </a:ext>
+            </a:extLst>
+          </p:cNvPr>
+          <p:cNvCxnSpPr>
+            <a:cxnSpLocks/>
+          </p:cNvCxnSpPr>
+          <p:nvPr/>
+        </p:nvCxnSpPr>
+        <p:spPr>
+          <a:xfrm>
+            <a:off x="5611368" y="1652204"/>
+            <a:ext cx="213996" cy="135764"/>
+          </a:xfrm>
+          <a:prstGeom prst="straightConnector1">
+            <a:avLst/>
+          </a:prstGeom>
+          <a:ln w="38100">
+            <a:solidFill>
+              <a:schemeClr val="tx1"/>
+            </a:solidFill>
+            <a:tailEnd type="triangle" w="lg" len="lg"/>
+          </a:ln>
+        </p:spPr>
+        <p:style>
+          <a:lnRef idx="1">
+            <a:schemeClr val="accent1"/>
+          </a:lnRef>
+          <a:fillRef idx="0">
+            <a:schemeClr val="accent1"/>
+          </a:fillRef>
+          <a:effectRef idx="0">
+            <a:schemeClr val="accent1"/>
+          </a:effectRef>
+          <a:fontRef idx="minor">
+            <a:schemeClr val="tx1"/>
+          </a:fontRef>
+        </p:style>
+      </p:cxnSp>
+      <p:cxnSp>
+        <p:nvCxnSpPr>
+          <p:cNvPr id="39" name="Straight Arrow Connector 38">
+            <a:extLst>
+              <a:ext uri="{FF2B5EF4-FFF2-40B4-BE49-F238E27FC236}">
+                <a16:creationId xmlns:a16="http://schemas.microsoft.com/office/drawing/2014/main" id="{7B98946F-4BDA-45D8-A391-CEDEDE0D0DB5}"/>
+              </a:ext>
+            </a:extLst>
+          </p:cNvPr>
+          <p:cNvCxnSpPr>
+            <a:cxnSpLocks/>
+          </p:cNvCxnSpPr>
+          <p:nvPr/>
+        </p:nvCxnSpPr>
+        <p:spPr>
+          <a:xfrm>
+            <a:off x="6445706" y="2581410"/>
+            <a:ext cx="80280" cy="194080"/>
+          </a:xfrm>
+          <a:prstGeom prst="straightConnector1">
+            <a:avLst/>
+          </a:prstGeom>
+          <a:ln w="38100">
+            <a:solidFill>
+              <a:schemeClr val="tx1"/>
+            </a:solidFill>
+            <a:tailEnd type="triangle" w="lg" len="lg"/>
+          </a:ln>
+        </p:spPr>
+        <p:style>
+          <a:lnRef idx="1">
+            <a:schemeClr val="accent1"/>
+          </a:lnRef>
+          <a:fillRef idx="0">
+            <a:schemeClr val="accent1"/>
+          </a:fillRef>
+          <a:effectRef idx="0">
+            <a:schemeClr val="accent1"/>
+          </a:effectRef>
+          <a:fontRef idx="minor">
+            <a:schemeClr val="tx1"/>
+          </a:fontRef>
+        </p:style>
+      </p:cxnSp>
+      <p:sp>
+        <p:nvSpPr>
+          <p:cNvPr id="40" name="TextBox 39">
+            <a:extLst>
+              <a:ext uri="{FF2B5EF4-FFF2-40B4-BE49-F238E27FC236}">
+                <a16:creationId xmlns:a16="http://schemas.microsoft.com/office/drawing/2014/main" id="{8DC35226-5BE1-4EB4-9582-816A2689C3EA}"/>
+              </a:ext>
+            </a:extLst>
+          </p:cNvPr>
+          <p:cNvSpPr txBox="1"/>
+          <p:nvPr/>
+        </p:nvSpPr>
+        <p:spPr>
+          <a:xfrm>
+            <a:off x="5463378" y="2428673"/>
+            <a:ext cx="941283" cy="369332"/>
+          </a:xfrm>
+          <a:prstGeom prst="rect">
+            <a:avLst/>
+          </a:prstGeom>
+          <a:noFill/>
+        </p:spPr>
+        <p:txBody>
+          <a:bodyPr wrap="none" rtlCol="0">
+            <a:spAutoFit/>
+          </a:bodyPr>
+          <a:lstStyle/>
+          <a:p>
+            <a:r>
+              <a:rPr lang="en-US" i="1">
+                <a:latin typeface="Arial" panose="020B0604020202020204" pitchFamily="34" charset="0"/>
+              </a:rPr>
+              <a:t>decode</a:t>
+            </a:r>
+          </a:p>
+        </p:txBody>
+      </p:sp>
+    </p:spTree>
+    <p:extLst>
+      <p:ext uri="{BB962C8B-B14F-4D97-AF65-F5344CB8AC3E}">
+        <p14:creationId xmlns:p14="http://schemas.microsoft.com/office/powerpoint/2010/main" val="2884792959"/>
       </p:ext>
     </p:extLst>
   </p:cSld>

</xml_diff>